<commit_message>
Added kristen M. activity diagram
</commit_message>
<xml_diff>
--- a/slides/Android Studio_Activities_Fragments.pptx
+++ b/slides/Android Studio_Activities_Fragments.pptx
@@ -18,15 +18,19 @@
     <p:sldId id="263" r:id="rId12"/>
     <p:sldId id="259" r:id="rId13"/>
     <p:sldId id="268" r:id="rId14"/>
-    <p:sldId id="269" r:id="rId15"/>
-    <p:sldId id="271" r:id="rId16"/>
-    <p:sldId id="272" r:id="rId17"/>
-    <p:sldId id="273" r:id="rId18"/>
-    <p:sldId id="274" r:id="rId19"/>
-    <p:sldId id="275" r:id="rId20"/>
-    <p:sldId id="276" r:id="rId21"/>
+    <p:sldId id="280" r:id="rId15"/>
+    <p:sldId id="269" r:id="rId16"/>
+    <p:sldId id="271" r:id="rId17"/>
+    <p:sldId id="272" r:id="rId18"/>
+    <p:sldId id="273" r:id="rId19"/>
+    <p:sldId id="274" r:id="rId20"/>
+    <p:sldId id="275" r:id="rId21"/>
     <p:sldId id="277" r:id="rId22"/>
-    <p:sldId id="267" r:id="rId23"/>
+    <p:sldId id="276" r:id="rId23"/>
+    <p:sldId id="279" r:id="rId24"/>
+    <p:sldId id="282" r:id="rId25"/>
+    <p:sldId id="281" r:id="rId26"/>
+    <p:sldId id="267" r:id="rId27"/>
   </p:sldIdLst>
   <p:sldSz cx="12192000" cy="6858000"/>
   <p:notesSz cx="6858000" cy="9144000"/>
@@ -125,7 +129,27 @@
       </a:defRPr>
     </a:lvl9pPr>
   </p:defaultTextStyle>
+  <p:extLst>
+    <p:ext uri="{EFAFB233-063F-42B5-8137-9DF3F51BA10A}">
+      <p15:sldGuideLst xmlns:p15="http://schemas.microsoft.com/office/powerpoint/2012/main">
+        <p15:guide id="1" orient="horz" pos="2160">
+          <p15:clr>
+            <a:srgbClr val="A4A3A4"/>
+          </p15:clr>
+        </p15:guide>
+        <p15:guide id="2" pos="3840">
+          <p15:clr>
+            <a:srgbClr val="A4A3A4"/>
+          </p15:clr>
+        </p15:guide>
+      </p15:sldGuideLst>
+    </p:ext>
+  </p:extLst>
 </p:presentation>
+</file>
+
+<file path=ppt/revisionInfo.xml><?xml version="1.0" encoding="utf-8"?>
+<p1510:revInfo xmlns:a="http://schemas.openxmlformats.org/drawingml/2006/main" xmlns:r="http://schemas.openxmlformats.org/officeDocument/2006/relationships" xmlns:p1510="http://schemas.microsoft.com/office/powerpoint/2015/10/main"/>
 </file>
 
 <file path=ppt/slideLayouts/slideLayout1.xml><?xml version="1.0" encoding="utf-8"?>
@@ -170,10 +194,9 @@
           </a:lstStyle>
           <a:p>
             <a:r>
-              <a:rPr lang="en-US" smtClean="0"/>
+              <a:rPr lang="en-US"/>
               <a:t>Click to edit Master title style</a:t>
             </a:r>
-            <a:endParaRPr lang="en-US"/>
           </a:p>
         </p:txBody>
       </p:sp>
@@ -289,10 +312,9 @@
           </a:lstStyle>
           <a:p>
             <a:r>
-              <a:rPr lang="en-US" smtClean="0"/>
+              <a:rPr lang="en-US"/>
               <a:t>Click to edit Master subtitle style</a:t>
             </a:r>
-            <a:endParaRPr lang="en-US"/>
           </a:p>
         </p:txBody>
       </p:sp>
@@ -313,7 +335,7 @@
           <a:p>
             <a:fld id="{1E7C2FAA-919F-4BF2-9DC6-6D7D1753D0B1}" type="datetimeFigureOut">
               <a:rPr lang="en-US" smtClean="0"/>
-              <a:t>5/2/2017</a:t>
+              <a:t>5/3/2017</a:t>
             </a:fld>
             <a:endParaRPr lang="en-US"/>
           </a:p>
@@ -407,10 +429,9 @@
           <a:lstStyle/>
           <a:p>
             <a:r>
-              <a:rPr lang="en-US" smtClean="0"/>
+              <a:rPr lang="en-US"/>
               <a:t>Click to edit Master title style</a:t>
             </a:r>
-            <a:endParaRPr lang="en-US"/>
           </a:p>
         </p:txBody>
       </p:sp>
@@ -431,38 +452,37 @@
           <a:p>
             <a:pPr lvl="0"/>
             <a:r>
-              <a:rPr lang="en-US" smtClean="0"/>
+              <a:rPr lang="en-US"/>
               <a:t>Click to edit Master text styles</a:t>
             </a:r>
           </a:p>
           <a:p>
             <a:pPr lvl="1"/>
             <a:r>
-              <a:rPr lang="en-US" smtClean="0"/>
+              <a:rPr lang="en-US"/>
               <a:t>Second level</a:t>
             </a:r>
           </a:p>
           <a:p>
             <a:pPr lvl="2"/>
             <a:r>
-              <a:rPr lang="en-US" smtClean="0"/>
+              <a:rPr lang="en-US"/>
               <a:t>Third level</a:t>
             </a:r>
           </a:p>
           <a:p>
             <a:pPr lvl="3"/>
             <a:r>
-              <a:rPr lang="en-US" smtClean="0"/>
+              <a:rPr lang="en-US"/>
               <a:t>Fourth level</a:t>
             </a:r>
           </a:p>
           <a:p>
             <a:pPr lvl="4"/>
             <a:r>
-              <a:rPr lang="en-US" smtClean="0"/>
+              <a:rPr lang="en-US"/>
               <a:t>Fifth level</a:t>
             </a:r>
-            <a:endParaRPr lang="en-US"/>
           </a:p>
         </p:txBody>
       </p:sp>
@@ -483,7 +503,7 @@
           <a:p>
             <a:fld id="{1E7C2FAA-919F-4BF2-9DC6-6D7D1753D0B1}" type="datetimeFigureOut">
               <a:rPr lang="en-US" smtClean="0"/>
-              <a:t>5/2/2017</a:t>
+              <a:t>5/3/2017</a:t>
             </a:fld>
             <a:endParaRPr lang="en-US"/>
           </a:p>
@@ -582,10 +602,9 @@
           <a:lstStyle/>
           <a:p>
             <a:r>
-              <a:rPr lang="en-US" smtClean="0"/>
+              <a:rPr lang="en-US"/>
               <a:t>Click to edit Master title style</a:t>
             </a:r>
-            <a:endParaRPr lang="en-US"/>
           </a:p>
         </p:txBody>
       </p:sp>
@@ -611,38 +630,37 @@
           <a:p>
             <a:pPr lvl="0"/>
             <a:r>
-              <a:rPr lang="en-US" smtClean="0"/>
+              <a:rPr lang="en-US"/>
               <a:t>Click to edit Master text styles</a:t>
             </a:r>
           </a:p>
           <a:p>
             <a:pPr lvl="1"/>
             <a:r>
-              <a:rPr lang="en-US" smtClean="0"/>
+              <a:rPr lang="en-US"/>
               <a:t>Second level</a:t>
             </a:r>
           </a:p>
           <a:p>
             <a:pPr lvl="2"/>
             <a:r>
-              <a:rPr lang="en-US" smtClean="0"/>
+              <a:rPr lang="en-US"/>
               <a:t>Third level</a:t>
             </a:r>
           </a:p>
           <a:p>
             <a:pPr lvl="3"/>
             <a:r>
-              <a:rPr lang="en-US" smtClean="0"/>
+              <a:rPr lang="en-US"/>
               <a:t>Fourth level</a:t>
             </a:r>
           </a:p>
           <a:p>
             <a:pPr lvl="4"/>
             <a:r>
-              <a:rPr lang="en-US" smtClean="0"/>
+              <a:rPr lang="en-US"/>
               <a:t>Fifth level</a:t>
             </a:r>
-            <a:endParaRPr lang="en-US"/>
           </a:p>
         </p:txBody>
       </p:sp>
@@ -663,7 +681,7 @@
           <a:p>
             <a:fld id="{1E7C2FAA-919F-4BF2-9DC6-6D7D1753D0B1}" type="datetimeFigureOut">
               <a:rPr lang="en-US" smtClean="0"/>
-              <a:t>5/2/2017</a:t>
+              <a:t>5/3/2017</a:t>
             </a:fld>
             <a:endParaRPr lang="en-US"/>
           </a:p>
@@ -766,7 +784,7 @@
           </a:lstStyle>
           <a:p>
             <a:r>
-              <a:rPr lang="en-US" smtClean="0"/>
+              <a:rPr lang="en-US"/>
               <a:t>Click to edit Master title style</a:t>
             </a:r>
             <a:endParaRPr lang="en-US" dirty="0"/>
@@ -795,38 +813,37 @@
           <a:p>
             <a:pPr lvl="0"/>
             <a:r>
-              <a:rPr lang="en-US" smtClean="0"/>
+              <a:rPr lang="en-US"/>
               <a:t>Click to edit Master text styles</a:t>
             </a:r>
           </a:p>
           <a:p>
             <a:pPr lvl="1"/>
             <a:r>
-              <a:rPr lang="en-US" smtClean="0"/>
+              <a:rPr lang="en-US"/>
               <a:t>Second level</a:t>
             </a:r>
           </a:p>
           <a:p>
             <a:pPr lvl="2"/>
             <a:r>
-              <a:rPr lang="en-US" smtClean="0"/>
+              <a:rPr lang="en-US"/>
               <a:t>Third level</a:t>
             </a:r>
           </a:p>
           <a:p>
             <a:pPr lvl="3"/>
             <a:r>
-              <a:rPr lang="en-US" smtClean="0"/>
+              <a:rPr lang="en-US"/>
               <a:t>Fourth level</a:t>
             </a:r>
           </a:p>
           <a:p>
             <a:pPr lvl="4"/>
             <a:r>
-              <a:rPr lang="en-US" smtClean="0"/>
+              <a:rPr lang="en-US"/>
               <a:t>Fifth level</a:t>
             </a:r>
-            <a:endParaRPr lang="en-US"/>
           </a:p>
         </p:txBody>
       </p:sp>
@@ -847,7 +864,7 @@
           <a:p>
             <a:fld id="{1E7C2FAA-919F-4BF2-9DC6-6D7D1753D0B1}" type="datetimeFigureOut">
               <a:rPr lang="en-US" smtClean="0"/>
-              <a:t>5/2/2017</a:t>
+              <a:t>5/3/2017</a:t>
             </a:fld>
             <a:endParaRPr lang="en-US"/>
           </a:p>
@@ -950,10 +967,9 @@
           </a:lstStyle>
           <a:p>
             <a:r>
-              <a:rPr lang="en-US" smtClean="0"/>
+              <a:rPr lang="en-US"/>
               <a:t>Click to edit Master title style</a:t>
             </a:r>
-            <a:endParaRPr lang="en-US"/>
           </a:p>
         </p:txBody>
       </p:sp>
@@ -1070,7 +1086,7 @@
           <a:p>
             <a:pPr lvl="0"/>
             <a:r>
-              <a:rPr lang="en-US" smtClean="0"/>
+              <a:rPr lang="en-US"/>
               <a:t>Click to edit Master text styles</a:t>
             </a:r>
           </a:p>
@@ -1093,7 +1109,7 @@
           <a:p>
             <a:fld id="{1E7C2FAA-919F-4BF2-9DC6-6D7D1753D0B1}" type="datetimeFigureOut">
               <a:rPr lang="en-US" smtClean="0"/>
-              <a:t>5/2/2017</a:t>
+              <a:t>5/3/2017</a:t>
             </a:fld>
             <a:endParaRPr lang="en-US"/>
           </a:p>
@@ -1196,10 +1212,9 @@
           </a:lstStyle>
           <a:p>
             <a:r>
-              <a:rPr lang="en-US" smtClean="0"/>
+              <a:rPr lang="en-US"/>
               <a:t>Click to edit Master title style</a:t>
             </a:r>
-            <a:endParaRPr lang="en-US"/>
           </a:p>
         </p:txBody>
       </p:sp>
@@ -1253,38 +1268,37 @@
           <a:p>
             <a:pPr lvl="0"/>
             <a:r>
-              <a:rPr lang="en-US" smtClean="0"/>
+              <a:rPr lang="en-US"/>
               <a:t>Click to edit Master text styles</a:t>
             </a:r>
           </a:p>
           <a:p>
             <a:pPr lvl="1"/>
             <a:r>
-              <a:rPr lang="en-US" smtClean="0"/>
+              <a:rPr lang="en-US"/>
               <a:t>Second level</a:t>
             </a:r>
           </a:p>
           <a:p>
             <a:pPr lvl="2"/>
             <a:r>
-              <a:rPr lang="en-US" smtClean="0"/>
+              <a:rPr lang="en-US"/>
               <a:t>Third level</a:t>
             </a:r>
           </a:p>
           <a:p>
             <a:pPr lvl="3"/>
             <a:r>
-              <a:rPr lang="en-US" smtClean="0"/>
+              <a:rPr lang="en-US"/>
               <a:t>Fourth level</a:t>
             </a:r>
           </a:p>
           <a:p>
             <a:pPr lvl="4"/>
             <a:r>
-              <a:rPr lang="en-US" smtClean="0"/>
+              <a:rPr lang="en-US"/>
               <a:t>Fifth level</a:t>
             </a:r>
-            <a:endParaRPr lang="en-US"/>
           </a:p>
         </p:txBody>
       </p:sp>
@@ -1338,38 +1352,37 @@
           <a:p>
             <a:pPr lvl="0"/>
             <a:r>
-              <a:rPr lang="en-US" smtClean="0"/>
+              <a:rPr lang="en-US"/>
               <a:t>Click to edit Master text styles</a:t>
             </a:r>
           </a:p>
           <a:p>
             <a:pPr lvl="1"/>
             <a:r>
-              <a:rPr lang="en-US" smtClean="0"/>
+              <a:rPr lang="en-US"/>
               <a:t>Second level</a:t>
             </a:r>
           </a:p>
           <a:p>
             <a:pPr lvl="2"/>
             <a:r>
-              <a:rPr lang="en-US" smtClean="0"/>
+              <a:rPr lang="en-US"/>
               <a:t>Third level</a:t>
             </a:r>
           </a:p>
           <a:p>
             <a:pPr lvl="3"/>
             <a:r>
-              <a:rPr lang="en-US" smtClean="0"/>
+              <a:rPr lang="en-US"/>
               <a:t>Fourth level</a:t>
             </a:r>
           </a:p>
           <a:p>
             <a:pPr lvl="4"/>
             <a:r>
-              <a:rPr lang="en-US" smtClean="0"/>
+              <a:rPr lang="en-US"/>
               <a:t>Fifth level</a:t>
             </a:r>
-            <a:endParaRPr lang="en-US"/>
           </a:p>
         </p:txBody>
       </p:sp>
@@ -1390,7 +1403,7 @@
           <a:p>
             <a:fld id="{1E7C2FAA-919F-4BF2-9DC6-6D7D1753D0B1}" type="datetimeFigureOut">
               <a:rPr lang="en-US" smtClean="0"/>
-              <a:t>5/2/2017</a:t>
+              <a:t>5/3/2017</a:t>
             </a:fld>
             <a:endParaRPr lang="en-US"/>
           </a:p>
@@ -1493,10 +1506,9 @@
           </a:lstStyle>
           <a:p>
             <a:r>
-              <a:rPr lang="en-US" smtClean="0"/>
+              <a:rPr lang="en-US"/>
               <a:t>Click to edit Master title style</a:t>
             </a:r>
-            <a:endParaRPr lang="en-US"/>
           </a:p>
         </p:txBody>
       </p:sp>
@@ -1559,7 +1571,7 @@
           <a:p>
             <a:pPr lvl="0"/>
             <a:r>
-              <a:rPr lang="en-US" smtClean="0"/>
+              <a:rPr lang="en-US"/>
               <a:t>Click to edit Master text styles</a:t>
             </a:r>
           </a:p>
@@ -1615,38 +1627,37 @@
           <a:p>
             <a:pPr lvl="0"/>
             <a:r>
-              <a:rPr lang="en-US" smtClean="0"/>
+              <a:rPr lang="en-US"/>
               <a:t>Click to edit Master text styles</a:t>
             </a:r>
           </a:p>
           <a:p>
             <a:pPr lvl="1"/>
             <a:r>
-              <a:rPr lang="en-US" smtClean="0"/>
+              <a:rPr lang="en-US"/>
               <a:t>Second level</a:t>
             </a:r>
           </a:p>
           <a:p>
             <a:pPr lvl="2"/>
             <a:r>
-              <a:rPr lang="en-US" smtClean="0"/>
+              <a:rPr lang="en-US"/>
               <a:t>Third level</a:t>
             </a:r>
           </a:p>
           <a:p>
             <a:pPr lvl="3"/>
             <a:r>
-              <a:rPr lang="en-US" smtClean="0"/>
+              <a:rPr lang="en-US"/>
               <a:t>Fourth level</a:t>
             </a:r>
           </a:p>
           <a:p>
             <a:pPr lvl="4"/>
             <a:r>
-              <a:rPr lang="en-US" smtClean="0"/>
+              <a:rPr lang="en-US"/>
               <a:t>Fifth level</a:t>
             </a:r>
-            <a:endParaRPr lang="en-US"/>
           </a:p>
         </p:txBody>
       </p:sp>
@@ -1709,7 +1720,7 @@
           <a:p>
             <a:pPr lvl="0"/>
             <a:r>
-              <a:rPr lang="en-US" smtClean="0"/>
+              <a:rPr lang="en-US"/>
               <a:t>Click to edit Master text styles</a:t>
             </a:r>
           </a:p>
@@ -1765,38 +1776,37 @@
           <a:p>
             <a:pPr lvl="0"/>
             <a:r>
-              <a:rPr lang="en-US" smtClean="0"/>
+              <a:rPr lang="en-US"/>
               <a:t>Click to edit Master text styles</a:t>
             </a:r>
           </a:p>
           <a:p>
             <a:pPr lvl="1"/>
             <a:r>
-              <a:rPr lang="en-US" smtClean="0"/>
+              <a:rPr lang="en-US"/>
               <a:t>Second level</a:t>
             </a:r>
           </a:p>
           <a:p>
             <a:pPr lvl="2"/>
             <a:r>
-              <a:rPr lang="en-US" smtClean="0"/>
+              <a:rPr lang="en-US"/>
               <a:t>Third level</a:t>
             </a:r>
           </a:p>
           <a:p>
             <a:pPr lvl="3"/>
             <a:r>
-              <a:rPr lang="en-US" smtClean="0"/>
+              <a:rPr lang="en-US"/>
               <a:t>Fourth level</a:t>
             </a:r>
           </a:p>
           <a:p>
             <a:pPr lvl="4"/>
             <a:r>
-              <a:rPr lang="en-US" smtClean="0"/>
+              <a:rPr lang="en-US"/>
               <a:t>Fifth level</a:t>
             </a:r>
-            <a:endParaRPr lang="en-US"/>
           </a:p>
         </p:txBody>
       </p:sp>
@@ -1817,7 +1827,7 @@
           <a:p>
             <a:fld id="{1E7C2FAA-919F-4BF2-9DC6-6D7D1753D0B1}" type="datetimeFigureOut">
               <a:rPr lang="en-US" smtClean="0"/>
-              <a:t>5/2/2017</a:t>
+              <a:t>5/3/2017</a:t>
             </a:fld>
             <a:endParaRPr lang="en-US"/>
           </a:p>
@@ -1911,10 +1921,9 @@
           <a:lstStyle/>
           <a:p>
             <a:r>
-              <a:rPr lang="en-US" smtClean="0"/>
+              <a:rPr lang="en-US"/>
               <a:t>Click to edit Master title style</a:t>
             </a:r>
-            <a:endParaRPr lang="en-US"/>
           </a:p>
         </p:txBody>
       </p:sp>
@@ -1935,7 +1944,7 @@
           <a:p>
             <a:fld id="{1E7C2FAA-919F-4BF2-9DC6-6D7D1753D0B1}" type="datetimeFigureOut">
               <a:rPr lang="en-US" smtClean="0"/>
-              <a:t>5/2/2017</a:t>
+              <a:t>5/3/2017</a:t>
             </a:fld>
             <a:endParaRPr lang="en-US"/>
           </a:p>
@@ -2030,7 +2039,7 @@
           <a:p>
             <a:fld id="{1E7C2FAA-919F-4BF2-9DC6-6D7D1753D0B1}" type="datetimeFigureOut">
               <a:rPr lang="en-US" smtClean="0"/>
-              <a:t>5/2/2017</a:t>
+              <a:t>5/3/2017</a:t>
             </a:fld>
             <a:endParaRPr lang="en-US"/>
           </a:p>
@@ -2052,10 +2061,9 @@
           <a:lstStyle/>
           <a:p>
             <a:r>
-              <a:rPr lang="en-US" smtClean="0"/>
+              <a:rPr lang="en-US"/>
               <a:t>Competition Sensitive. Do Not Disclose.</a:t>
             </a:r>
-            <a:endParaRPr lang="en-US"/>
           </a:p>
         </p:txBody>
       </p:sp>
@@ -2137,10 +2145,9 @@
           </a:lstStyle>
           <a:p>
             <a:r>
-              <a:rPr lang="en-US" smtClean="0"/>
+              <a:rPr lang="en-US"/>
               <a:t>Click to edit Master title style</a:t>
             </a:r>
-            <a:endParaRPr lang="en-US"/>
           </a:p>
         </p:txBody>
       </p:sp>
@@ -2194,38 +2201,37 @@
           <a:p>
             <a:pPr lvl="0"/>
             <a:r>
-              <a:rPr lang="en-US" smtClean="0"/>
+              <a:rPr lang="en-US"/>
               <a:t>Click to edit Master text styles</a:t>
             </a:r>
           </a:p>
           <a:p>
             <a:pPr lvl="1"/>
             <a:r>
-              <a:rPr lang="en-US" smtClean="0"/>
+              <a:rPr lang="en-US"/>
               <a:t>Second level</a:t>
             </a:r>
           </a:p>
           <a:p>
             <a:pPr lvl="2"/>
             <a:r>
-              <a:rPr lang="en-US" smtClean="0"/>
+              <a:rPr lang="en-US"/>
               <a:t>Third level</a:t>
             </a:r>
           </a:p>
           <a:p>
             <a:pPr lvl="3"/>
             <a:r>
-              <a:rPr lang="en-US" smtClean="0"/>
+              <a:rPr lang="en-US"/>
               <a:t>Fourth level</a:t>
             </a:r>
           </a:p>
           <a:p>
             <a:pPr lvl="4"/>
             <a:r>
-              <a:rPr lang="en-US" smtClean="0"/>
+              <a:rPr lang="en-US"/>
               <a:t>Fifth level</a:t>
             </a:r>
-            <a:endParaRPr lang="en-US"/>
           </a:p>
         </p:txBody>
       </p:sp>
@@ -2288,7 +2294,7 @@
           <a:p>
             <a:pPr lvl="0"/>
             <a:r>
-              <a:rPr lang="en-US" smtClean="0"/>
+              <a:rPr lang="en-US"/>
               <a:t>Click to edit Master text styles</a:t>
             </a:r>
           </a:p>
@@ -2311,7 +2317,7 @@
           <a:p>
             <a:fld id="{1E7C2FAA-919F-4BF2-9DC6-6D7D1753D0B1}" type="datetimeFigureOut">
               <a:rPr lang="en-US" smtClean="0"/>
-              <a:t>5/2/2017</a:t>
+              <a:t>5/3/2017</a:t>
             </a:fld>
             <a:endParaRPr lang="en-US"/>
           </a:p>
@@ -2333,10 +2339,9 @@
           <a:lstStyle/>
           <a:p>
             <a:r>
-              <a:rPr lang="en-US" smtClean="0"/>
+              <a:rPr lang="en-US"/>
               <a:t>Competition Sensitive. Do Not Disclose.</a:t>
             </a:r>
-            <a:endParaRPr lang="en-US"/>
           </a:p>
         </p:txBody>
       </p:sp>
@@ -2418,10 +2423,9 @@
           </a:lstStyle>
           <a:p>
             <a:r>
-              <a:rPr lang="en-US" smtClean="0"/>
+              <a:rPr lang="en-US"/>
               <a:t>Click to edit Master title style</a:t>
             </a:r>
-            <a:endParaRPr lang="en-US"/>
           </a:p>
         </p:txBody>
       </p:sp>
@@ -2483,10 +2487,9 @@
           </a:lstStyle>
           <a:p>
             <a:r>
-              <a:rPr lang="en-US" smtClean="0"/>
+              <a:rPr lang="en-US"/>
               <a:t>Click icon to add picture</a:t>
             </a:r>
-            <a:endParaRPr lang="en-US"/>
           </a:p>
         </p:txBody>
       </p:sp>
@@ -2549,7 +2552,7 @@
           <a:p>
             <a:pPr lvl="0"/>
             <a:r>
-              <a:rPr lang="en-US" smtClean="0"/>
+              <a:rPr lang="en-US"/>
               <a:t>Click to edit Master text styles</a:t>
             </a:r>
           </a:p>
@@ -2572,7 +2575,7 @@
           <a:p>
             <a:fld id="{1E7C2FAA-919F-4BF2-9DC6-6D7D1753D0B1}" type="datetimeFigureOut">
               <a:rPr lang="en-US" smtClean="0"/>
-              <a:t>5/2/2017</a:t>
+              <a:t>5/3/2017</a:t>
             </a:fld>
             <a:endParaRPr lang="en-US"/>
           </a:p>
@@ -2594,10 +2597,9 @@
           <a:lstStyle/>
           <a:p>
             <a:r>
-              <a:rPr lang="en-US" smtClean="0"/>
+              <a:rPr lang="en-US"/>
               <a:t>Competition Sensitive. Do Not Disclose.</a:t>
             </a:r>
-            <a:endParaRPr lang="en-US"/>
           </a:p>
         </p:txBody>
       </p:sp>
@@ -2726,7 +2728,7 @@
           <a:lstStyle/>
           <a:p>
             <a:r>
-              <a:rPr lang="en-US" smtClean="0"/>
+              <a:rPr lang="en-US"/>
               <a:t>Click to edit Master title style</a:t>
             </a:r>
             <a:endParaRPr lang="en-US" dirty="0"/>
@@ -2760,35 +2762,35 @@
           <a:p>
             <a:pPr lvl="0"/>
             <a:r>
-              <a:rPr lang="en-US" smtClean="0"/>
+              <a:rPr lang="en-US"/>
               <a:t>Click to edit Master text styles</a:t>
             </a:r>
           </a:p>
           <a:p>
             <a:pPr lvl="1"/>
             <a:r>
-              <a:rPr lang="en-US" smtClean="0"/>
+              <a:rPr lang="en-US"/>
               <a:t>Second level</a:t>
             </a:r>
           </a:p>
           <a:p>
             <a:pPr lvl="2"/>
             <a:r>
-              <a:rPr lang="en-US" smtClean="0"/>
+              <a:rPr lang="en-US"/>
               <a:t>Third level</a:t>
             </a:r>
           </a:p>
           <a:p>
             <a:pPr lvl="3"/>
             <a:r>
-              <a:rPr lang="en-US" smtClean="0"/>
+              <a:rPr lang="en-US"/>
               <a:t>Fourth level</a:t>
             </a:r>
           </a:p>
           <a:p>
             <a:pPr lvl="4"/>
             <a:r>
-              <a:rPr lang="en-US" smtClean="0"/>
+              <a:rPr lang="en-US"/>
               <a:t>Fifth level</a:t>
             </a:r>
             <a:endParaRPr lang="en-US" dirty="0"/>
@@ -2830,7 +2832,7 @@
           <a:p>
             <a:fld id="{1E7C2FAA-919F-4BF2-9DC6-6D7D1753D0B1}" type="datetimeFigureOut">
               <a:rPr lang="en-US" smtClean="0"/>
-              <a:t>5/2/2017</a:t>
+              <a:t>5/3/2017</a:t>
             </a:fld>
             <a:endParaRPr lang="en-US"/>
           </a:p>
@@ -3259,13 +3261,6 @@
   <p:clrMapOvr>
     <a:masterClrMapping/>
   </p:clrMapOvr>
-  <p:timing>
-    <p:tnLst>
-      <p:par>
-        <p:cTn id="1" dur="indefinite" restart="never" nodeType="tmRoot"/>
-      </p:par>
-    </p:tnLst>
-  </p:timing>
 </p:sld>
 </file>
 
@@ -3302,10 +3297,9 @@
           <a:lstStyle/>
           <a:p>
             <a:r>
-              <a:rPr lang="en-US" dirty="0" smtClean="0"/>
+              <a:rPr lang="en-US" dirty="0"/>
               <a:t>Think of an Activity as a picture frame</a:t>
             </a:r>
-            <a:endParaRPr lang="en-US" dirty="0"/>
           </a:p>
         </p:txBody>
       </p:sp>
@@ -3379,7 +3373,6 @@
               <a:rPr lang="en-US" sz="9600" dirty="0"/>
               <a:t>=</a:t>
             </a:r>
-            <a:endParaRPr lang="en-US" sz="9600" dirty="0" smtClean="0"/>
           </a:p>
         </p:txBody>
       </p:sp>
@@ -3423,13 +3416,6 @@
   <p:clrMapOvr>
     <a:masterClrMapping/>
   </p:clrMapOvr>
-  <p:timing>
-    <p:tnLst>
-      <p:par>
-        <p:cTn id="1" dur="indefinite" restart="never" nodeType="tmRoot"/>
-      </p:par>
-    </p:tnLst>
-  </p:timing>
 </p:sld>
 </file>
 
@@ -3466,10 +3452,9 @@
           <a:lstStyle/>
           <a:p>
             <a:r>
-              <a:rPr lang="en-US" dirty="0" smtClean="0"/>
+              <a:rPr lang="en-US" dirty="0"/>
               <a:t>How Activity is like a Picture frame?</a:t>
             </a:r>
-            <a:endParaRPr lang="en-US" dirty="0"/>
           </a:p>
         </p:txBody>
       </p:sp>
@@ -3548,7 +3533,7 @@
                 <a:buChar char="•"/>
               </a:pPr>
               <a:r>
-                <a:rPr lang="en-US" dirty="0" smtClean="0"/>
+                <a:rPr lang="en-US" dirty="0"/>
                 <a:t>Defines the dimensions</a:t>
               </a:r>
             </a:p>
@@ -3753,10 +3738,9 @@
                   <a:buChar char="•"/>
                 </a:pPr>
                 <a:r>
-                  <a:rPr lang="en-US" dirty="0" smtClean="0"/>
+                  <a:rPr lang="en-US" dirty="0"/>
                   <a:t>Defines orientation, either portrait or landscape </a:t>
                 </a:r>
-                <a:endParaRPr lang="en-US" dirty="0"/>
               </a:p>
             </p:txBody>
           </p:sp>
@@ -3838,10 +3822,9 @@
                 <a:buChar char="•"/>
               </a:pPr>
               <a:r>
-                <a:rPr lang="en-US" dirty="0" smtClean="0"/>
+                <a:rPr lang="en-US" dirty="0"/>
                 <a:t>Defines the decorations </a:t>
               </a:r>
-              <a:endParaRPr lang="en-US" dirty="0"/>
             </a:p>
           </p:txBody>
         </p:sp>
@@ -4296,13 +4279,7 @@
               <a:rPr lang="en-US" sz="2200" dirty="0">
                 <a:hlinkClick r:id="rId2"/>
               </a:rPr>
-              <a:t>https://</a:t>
-            </a:r>
-            <a:r>
-              <a:rPr lang="en-US" sz="2200" dirty="0" smtClean="0">
-                <a:hlinkClick r:id="rId2"/>
-              </a:rPr>
-              <a:t>developer.android.com/guide/components/fragments.html</a:t>
+              <a:t>https://developer.android.com/guide/components/fragments.html</a:t>
             </a:r>
             <a:endParaRPr lang="en-US" dirty="0"/>
           </a:p>
@@ -4324,33 +4301,33 @@
           <a:lstStyle/>
           <a:p>
             <a:r>
-              <a:rPr lang="en-US" dirty="0" smtClean="0"/>
+              <a:rPr lang="en-US" dirty="0"/>
               <a:t>View and Layout logic</a:t>
             </a:r>
           </a:p>
           <a:p>
             <a:r>
-              <a:rPr lang="en-US" dirty="0" smtClean="0"/>
+              <a:rPr lang="en-US" dirty="0"/>
               <a:t>Event handling (i.e. </a:t>
             </a:r>
             <a:r>
-              <a:rPr lang="en-US" dirty="0" err="1" smtClean="0"/>
+              <a:rPr lang="en-US" dirty="0" err="1"/>
               <a:t>onClick</a:t>
             </a:r>
             <a:r>
-              <a:rPr lang="en-US" dirty="0" smtClean="0"/>
+              <a:rPr lang="en-US" dirty="0"/>
               <a:t>())</a:t>
             </a:r>
           </a:p>
           <a:p>
             <a:r>
-              <a:rPr lang="en-US" dirty="0" smtClean="0"/>
+              <a:rPr lang="en-US" dirty="0"/>
               <a:t>Network request </a:t>
             </a:r>
           </a:p>
           <a:p>
             <a:r>
-              <a:rPr lang="en-US" dirty="0" smtClean="0"/>
+              <a:rPr lang="en-US" dirty="0"/>
               <a:t>Interacting with a persistence storage</a:t>
             </a:r>
           </a:p>
@@ -4366,13 +4343,6 @@
   <p:clrMapOvr>
     <a:masterClrMapping/>
   </p:clrMapOvr>
-  <p:timing>
-    <p:tnLst>
-      <p:par>
-        <p:cTn id="1" dur="indefinite" restart="never" nodeType="tmRoot"/>
-      </p:par>
-    </p:tnLst>
-  </p:timing>
 </p:sld>
 </file>
 
@@ -4432,17 +4402,16 @@
             <a:pPr marL="0" indent="0" algn="ctr">
               <a:buNone/>
             </a:pPr>
-            <a:endParaRPr lang="en-US" sz="6600" dirty="0" smtClean="0"/>
+            <a:endParaRPr lang="en-US" sz="6600" dirty="0"/>
           </a:p>
           <a:p>
             <a:pPr marL="0" indent="0" algn="ctr">
               <a:buNone/>
             </a:pPr>
             <a:r>
-              <a:rPr lang="en-US" sz="6600" dirty="0" smtClean="0"/>
+              <a:rPr lang="en-US" sz="6600" dirty="0"/>
               <a:t>Detail Level </a:t>
             </a:r>
-            <a:endParaRPr lang="en-US" sz="6600" dirty="0"/>
           </a:p>
         </p:txBody>
       </p:sp>
@@ -4456,13 +4425,6 @@
   <p:clrMapOvr>
     <a:masterClrMapping/>
   </p:clrMapOvr>
-  <p:timing>
-    <p:tnLst>
-      <p:par>
-        <p:cTn id="1" dur="indefinite" restart="never" nodeType="tmRoot"/>
-      </p:par>
-    </p:tnLst>
-  </p:timing>
 </p:sld>
 </file>
 
@@ -4483,13 +4445,34 @@
           <a:chExt cx="0" cy="0"/>
         </a:xfrm>
       </p:grpSpPr>
+      <p:sp>
+        <p:nvSpPr>
+          <p:cNvPr id="2" name="Title 1"/>
+          <p:cNvSpPr>
+            <a:spLocks noGrp="1"/>
+          </p:cNvSpPr>
+          <p:nvPr>
+            <p:ph type="title"/>
+          </p:nvPr>
+        </p:nvSpPr>
+        <p:spPr/>
+        <p:txBody>
+          <a:bodyPr/>
+          <a:lstStyle/>
+          <a:p>
+            <a:endParaRPr lang="en-US"/>
+          </a:p>
+        </p:txBody>
+      </p:sp>
       <p:pic>
         <p:nvPicPr>
-          <p:cNvPr id="16" name="Content Placeholder 3"/>
+          <p:cNvPr id="4" name="Content Placeholder 3"/>
           <p:cNvPicPr>
-            <a:picLocks noChangeAspect="1"/>
+            <a:picLocks noGrp="1" noChangeAspect="1"/>
           </p:cNvPicPr>
-          <p:nvPr/>
+          <p:nvPr>
+            <p:ph idx="1"/>
+          </p:nvPr>
         </p:nvPicPr>
         <p:blipFill>
           <a:blip r:embed="rId2">
@@ -4505,180 +4488,24 @@
         </p:blipFill>
         <p:spPr>
           <a:xfrm>
-            <a:off x="5523848" y="901998"/>
-            <a:ext cx="3943705" cy="5096836"/>
+            <a:off x="4345005" y="1600200"/>
+            <a:ext cx="3501989" cy="4525963"/>
           </a:xfrm>
           <a:prstGeom prst="rect">
             <a:avLst/>
           </a:prstGeom>
         </p:spPr>
       </p:pic>
-      <p:sp>
-        <p:nvSpPr>
-          <p:cNvPr id="2" name="Title 1"/>
-          <p:cNvSpPr>
-            <a:spLocks noGrp="1"/>
-          </p:cNvSpPr>
-          <p:nvPr>
-            <p:ph type="title"/>
-          </p:nvPr>
-        </p:nvSpPr>
-        <p:spPr/>
-        <p:txBody>
-          <a:bodyPr/>
-          <a:lstStyle/>
-          <a:p>
-            <a:r>
-              <a:rPr lang="en-US" dirty="0" smtClean="0"/>
-              <a:t>Activity </a:t>
-            </a:r>
-            <a:r>
-              <a:rPr lang="en-US" dirty="0" smtClean="0"/>
-              <a:t>Lifecycle</a:t>
-            </a:r>
-            <a:endParaRPr lang="en-US" dirty="0"/>
-          </a:p>
-        </p:txBody>
-      </p:sp>
-      <p:grpSp>
-        <p:nvGrpSpPr>
-          <p:cNvPr id="9" name="Group 8"/>
-          <p:cNvGrpSpPr/>
-          <p:nvPr/>
-        </p:nvGrpSpPr>
-        <p:grpSpPr>
-          <a:xfrm>
-            <a:off x="724395" y="1525783"/>
-            <a:ext cx="7077792" cy="1285724"/>
-            <a:chOff x="724395" y="1525783"/>
-            <a:chExt cx="7077792" cy="1285724"/>
-          </a:xfrm>
-        </p:grpSpPr>
-        <p:sp>
-          <p:nvSpPr>
-            <p:cNvPr id="5" name="TextBox 4"/>
-            <p:cNvSpPr txBox="1"/>
-            <p:nvPr/>
-          </p:nvSpPr>
-          <p:spPr>
-            <a:xfrm>
-              <a:off x="724395" y="1888177"/>
-              <a:ext cx="5474524" cy="923330"/>
-            </a:xfrm>
-            <a:prstGeom prst="rect">
-              <a:avLst/>
-            </a:prstGeom>
-            <a:noFill/>
-          </p:spPr>
-          <p:txBody>
-            <a:bodyPr wrap="square" rtlCol="0">
-              <a:spAutoFit/>
-            </a:bodyPr>
-            <a:lstStyle/>
-            <a:p>
-              <a:r>
-                <a:rPr lang="en-US" b="1" dirty="0" smtClean="0"/>
-                <a:t>onCreate()  </a:t>
-              </a:r>
-              <a:r>
-                <a:rPr lang="en-US" dirty="0" smtClean="0"/>
-                <a:t>started, but not visible</a:t>
-              </a:r>
-            </a:p>
-            <a:p>
-              <a:pPr marL="285750" indent="-285750">
-                <a:buFont typeface="Arial" panose="020B0604020202020204" pitchFamily="34" charset="0"/>
-                <a:buChar char="•"/>
-              </a:pPr>
-              <a:r>
-                <a:rPr lang="en-US" dirty="0" smtClean="0"/>
-                <a:t>Call </a:t>
-              </a:r>
-              <a:r>
-                <a:rPr lang="en-US" u="sng" dirty="0" err="1" smtClean="0"/>
-                <a:t>setContentView</a:t>
-              </a:r>
-              <a:r>
-                <a:rPr lang="en-US" u="sng" dirty="0" smtClean="0"/>
-                <a:t>() </a:t>
-              </a:r>
-            </a:p>
-            <a:p>
-              <a:pPr marL="285750" indent="-285750">
-                <a:buFont typeface="Arial" panose="020B0604020202020204" pitchFamily="34" charset="0"/>
-                <a:buChar char="•"/>
-              </a:pPr>
-              <a:r>
-                <a:rPr lang="en-US" dirty="0" smtClean="0"/>
-                <a:t>Initialize code </a:t>
-              </a:r>
-            </a:p>
-          </p:txBody>
-        </p:sp>
-        <p:sp>
-          <p:nvSpPr>
-            <p:cNvPr id="6" name="Rectangle 5"/>
-            <p:cNvSpPr/>
-            <p:nvPr/>
-          </p:nvSpPr>
-          <p:spPr>
-            <a:xfrm>
-              <a:off x="6879573" y="1525783"/>
-              <a:ext cx="922614" cy="232410"/>
-            </a:xfrm>
-            <a:prstGeom prst="rect">
-              <a:avLst/>
-            </a:prstGeom>
-            <a:noFill/>
-            <a:ln w="38100">
-              <a:solidFill>
-                <a:srgbClr val="FF0000"/>
-              </a:solidFill>
-            </a:ln>
-          </p:spPr>
-          <p:style>
-            <a:lnRef idx="2">
-              <a:schemeClr val="accent1">
-                <a:shade val="50000"/>
-              </a:schemeClr>
-            </a:lnRef>
-            <a:fillRef idx="1">
-              <a:schemeClr val="accent1"/>
-            </a:fillRef>
-            <a:effectRef idx="0">
-              <a:schemeClr val="accent1"/>
-            </a:effectRef>
-            <a:fontRef idx="minor">
-              <a:schemeClr val="lt1"/>
-            </a:fontRef>
-          </p:style>
-          <p:txBody>
-            <a:bodyPr rtlCol="0" anchor="ctr"/>
-            <a:lstStyle/>
-            <a:p>
-              <a:pPr algn="ctr"/>
-              <a:endParaRPr lang="en-US"/>
-            </a:p>
-          </p:txBody>
-        </p:sp>
-      </p:grpSp>
     </p:spTree>
     <p:extLst>
       <p:ext uri="{BB962C8B-B14F-4D97-AF65-F5344CB8AC3E}">
-        <p14:creationId xmlns:p14="http://schemas.microsoft.com/office/powerpoint/2010/main" val="4060041946"/>
+        <p14:creationId xmlns:p14="http://schemas.microsoft.com/office/powerpoint/2010/main" val="3554290345"/>
       </p:ext>
     </p:extLst>
   </p:cSld>
   <p:clrMapOvr>
     <a:masterClrMapping/>
   </p:clrMapOvr>
-  <p:timing>
-    <p:tnLst>
-      <p:par>
-        <p:cTn id="1" dur="indefinite" restart="never" nodeType="tmRoot"/>
-      </p:par>
-    </p:tnLst>
-  </p:timing>
 </p:sld>
 </file>
 
@@ -4715,16 +4542,48 @@
           <a:lstStyle/>
           <a:p>
             <a:r>
-              <a:rPr lang="en-US" dirty="0" smtClean="0"/>
-              <a:t>Activity Lifecycle </a:t>
-            </a:r>
-            <a:endParaRPr lang="en-US" dirty="0"/>
+              <a:rPr lang="en-US" dirty="0"/>
+              <a:t>Activity Lifecycle</a:t>
+            </a:r>
+          </a:p>
+        </p:txBody>
+      </p:sp>
+      <p:sp>
+        <p:nvSpPr>
+          <p:cNvPr id="5" name="TextBox 4"/>
+          <p:cNvSpPr txBox="1"/>
+          <p:nvPr/>
+        </p:nvSpPr>
+        <p:spPr>
+          <a:xfrm>
+            <a:off x="724395" y="1888177"/>
+            <a:ext cx="5474524" cy="369332"/>
+          </a:xfrm>
+          <a:prstGeom prst="rect">
+            <a:avLst/>
+          </a:prstGeom>
+          <a:noFill/>
+        </p:spPr>
+        <p:txBody>
+          <a:bodyPr wrap="square" rtlCol="0">
+            <a:spAutoFit/>
+          </a:bodyPr>
+          <a:lstStyle/>
+          <a:p>
+            <a:r>
+              <a:rPr lang="en-US" b="1" dirty="0"/>
+              <a:t>onCreate()  </a:t>
+            </a:r>
+            <a:r>
+              <a:rPr lang="en-US" dirty="0"/>
+              <a:t>started, but not visible</a:t>
+            </a:r>
           </a:p>
         </p:txBody>
       </p:sp>
       <p:pic>
         <p:nvPicPr>
-          <p:cNvPr id="4" name="Content Placeholder 3"/>
+          <p:cNvPr id="10" name="Picture 9"/>
           <p:cNvPicPr>
             <a:picLocks noChangeAspect="1"/>
           </p:cNvPicPr>
@@ -4744,125 +4603,24 @@
         </p:blipFill>
         <p:spPr>
           <a:xfrm>
-            <a:off x="5523848" y="901998"/>
-            <a:ext cx="3943705" cy="5096836"/>
+            <a:off x="5167619" y="2553127"/>
+            <a:ext cx="6395207" cy="2764136"/>
           </a:xfrm>
           <a:prstGeom prst="rect">
             <a:avLst/>
           </a:prstGeom>
         </p:spPr>
       </p:pic>
-      <p:sp>
-        <p:nvSpPr>
-          <p:cNvPr id="5" name="TextBox 4"/>
-          <p:cNvSpPr txBox="1"/>
-          <p:nvPr/>
-        </p:nvSpPr>
-        <p:spPr>
-          <a:xfrm>
-            <a:off x="819645" y="1906796"/>
-            <a:ext cx="6222670" cy="646331"/>
-          </a:xfrm>
-          <a:prstGeom prst="rect">
-            <a:avLst/>
-          </a:prstGeom>
-          <a:noFill/>
-        </p:spPr>
-        <p:txBody>
-          <a:bodyPr wrap="square" rtlCol="0">
-            <a:spAutoFit/>
-          </a:bodyPr>
-          <a:lstStyle/>
-          <a:p>
-            <a:r>
-              <a:rPr lang="en-US" b="1" dirty="0" err="1" smtClean="0"/>
-              <a:t>onStart</a:t>
-            </a:r>
-            <a:r>
-              <a:rPr lang="en-US" b="1" dirty="0" smtClean="0"/>
-              <a:t>() </a:t>
-            </a:r>
-            <a:r>
-              <a:rPr lang="en-US" dirty="0" smtClean="0"/>
-              <a:t>visible, but ready for interaction</a:t>
-            </a:r>
-          </a:p>
-          <a:p>
-            <a:pPr marL="285750" indent="-285750">
-              <a:buFont typeface="Arial" panose="020B0604020202020204" pitchFamily="34" charset="0"/>
-              <a:buChar char="•"/>
-            </a:pPr>
-            <a:r>
-              <a:rPr lang="en-US" dirty="0" smtClean="0"/>
-              <a:t>Initialize monitors that affect the Views </a:t>
-            </a:r>
-            <a:endParaRPr lang="en-US" dirty="0"/>
-          </a:p>
-        </p:txBody>
-      </p:sp>
-      <p:sp>
-        <p:nvSpPr>
-          <p:cNvPr id="6" name="Rectangle 5"/>
-          <p:cNvSpPr/>
-          <p:nvPr/>
-        </p:nvSpPr>
-        <p:spPr>
-          <a:xfrm>
-            <a:off x="6882385" y="1914424"/>
-            <a:ext cx="922614" cy="232410"/>
-          </a:xfrm>
-          <a:prstGeom prst="rect">
-            <a:avLst/>
-          </a:prstGeom>
-          <a:noFill/>
-          <a:ln w="38100">
-            <a:solidFill>
-              <a:srgbClr val="FF0000"/>
-            </a:solidFill>
-          </a:ln>
-        </p:spPr>
-        <p:style>
-          <a:lnRef idx="2">
-            <a:schemeClr val="accent1">
-              <a:shade val="50000"/>
-            </a:schemeClr>
-          </a:lnRef>
-          <a:fillRef idx="1">
-            <a:schemeClr val="accent1"/>
-          </a:fillRef>
-          <a:effectRef idx="0">
-            <a:schemeClr val="accent1"/>
-          </a:effectRef>
-          <a:fontRef idx="minor">
-            <a:schemeClr val="lt1"/>
-          </a:fontRef>
-        </p:style>
-        <p:txBody>
-          <a:bodyPr rtlCol="0" anchor="ctr"/>
-          <a:lstStyle/>
-          <a:p>
-            <a:pPr algn="ctr"/>
-            <a:endParaRPr lang="en-US"/>
-          </a:p>
-        </p:txBody>
-      </p:sp>
     </p:spTree>
     <p:extLst>
       <p:ext uri="{BB962C8B-B14F-4D97-AF65-F5344CB8AC3E}">
-        <p14:creationId xmlns:p14="http://schemas.microsoft.com/office/powerpoint/2010/main" val="335025673"/>
+        <p14:creationId xmlns:p14="http://schemas.microsoft.com/office/powerpoint/2010/main" val="4060041946"/>
       </p:ext>
     </p:extLst>
   </p:cSld>
   <p:clrMapOvr>
     <a:masterClrMapping/>
   </p:clrMapOvr>
-  <p:timing>
-    <p:tnLst>
-      <p:par>
-        <p:cTn id="1" dur="indefinite" restart="never" nodeType="tmRoot"/>
-      </p:par>
-    </p:tnLst>
-  </p:timing>
 </p:sld>
 </file>
 
@@ -4885,7 +4643,7 @@
       </p:grpSpPr>
       <p:sp>
         <p:nvSpPr>
-          <p:cNvPr id="8" name="Title 1"/>
+          <p:cNvPr id="2" name="Title 1"/>
           <p:cNvSpPr>
             <a:spLocks noGrp="1"/>
           </p:cNvSpPr>
@@ -4899,16 +4657,15 @@
           <a:lstStyle/>
           <a:p>
             <a:r>
-              <a:rPr lang="en-US" dirty="0" smtClean="0"/>
+              <a:rPr lang="en-US" dirty="0"/>
               <a:t>Activity Lifecycle </a:t>
             </a:r>
-            <a:endParaRPr lang="en-US" dirty="0"/>
-          </a:p>
-        </p:txBody>
-      </p:sp>
-      <p:sp>
-        <p:nvSpPr>
-          <p:cNvPr id="10" name="TextBox 9"/>
+          </a:p>
+        </p:txBody>
+      </p:sp>
+      <p:sp>
+        <p:nvSpPr>
+          <p:cNvPr id="5" name="TextBox 4"/>
           <p:cNvSpPr txBox="1"/>
           <p:nvPr/>
         </p:nvSpPr>
@@ -4929,27 +4686,23 @@
           <a:lstStyle/>
           <a:p>
             <a:r>
-              <a:rPr lang="en-US" b="1" dirty="0" err="1" smtClean="0"/>
-              <a:t>onResume</a:t>
-            </a:r>
-            <a:r>
-              <a:rPr lang="en-US" b="1" dirty="0" smtClean="0"/>
+              <a:rPr lang="en-US" b="1" dirty="0" err="1"/>
+              <a:t>onStart</a:t>
+            </a:r>
+            <a:r>
+              <a:rPr lang="en-US" b="1" dirty="0"/>
               <a:t>() </a:t>
             </a:r>
             <a:r>
-              <a:rPr lang="en-US" dirty="0" smtClean="0"/>
-              <a:t>in the foreground, ready for interactio</a:t>
-            </a:r>
-            <a:r>
-              <a:rPr lang="en-US" dirty="0"/>
-              <a:t>n</a:t>
+              <a:rPr lang="en-US" dirty="0"/>
+              <a:t>visible, but not ready for interaction</a:t>
             </a:r>
           </a:p>
         </p:txBody>
       </p:sp>
       <p:pic>
         <p:nvPicPr>
-          <p:cNvPr id="12" name="Content Placeholder 3"/>
+          <p:cNvPr id="7" name="Picture 6"/>
           <p:cNvPicPr>
             <a:picLocks noChangeAspect="1"/>
           </p:cNvPicPr>
@@ -4969,77 +4722,24 @@
         </p:blipFill>
         <p:spPr>
           <a:xfrm>
-            <a:off x="5523848" y="901998"/>
-            <a:ext cx="3943705" cy="5096836"/>
+            <a:off x="5167619" y="2553127"/>
+            <a:ext cx="6395207" cy="2764136"/>
           </a:xfrm>
           <a:prstGeom prst="rect">
             <a:avLst/>
           </a:prstGeom>
         </p:spPr>
       </p:pic>
-      <p:sp>
-        <p:nvSpPr>
-          <p:cNvPr id="11" name="Rectangle 10"/>
-          <p:cNvSpPr/>
-          <p:nvPr/>
-        </p:nvSpPr>
-        <p:spPr>
-          <a:xfrm>
-            <a:off x="6880563" y="2310710"/>
-            <a:ext cx="922614" cy="232410"/>
-          </a:xfrm>
-          <a:prstGeom prst="rect">
-            <a:avLst/>
-          </a:prstGeom>
-          <a:noFill/>
-          <a:ln w="38100">
-            <a:solidFill>
-              <a:srgbClr val="FF0000"/>
-            </a:solidFill>
-          </a:ln>
-        </p:spPr>
-        <p:style>
-          <a:lnRef idx="2">
-            <a:schemeClr val="accent1">
-              <a:shade val="50000"/>
-            </a:schemeClr>
-          </a:lnRef>
-          <a:fillRef idx="1">
-            <a:schemeClr val="accent1"/>
-          </a:fillRef>
-          <a:effectRef idx="0">
-            <a:schemeClr val="accent1"/>
-          </a:effectRef>
-          <a:fontRef idx="minor">
-            <a:schemeClr val="lt1"/>
-          </a:fontRef>
-        </p:style>
-        <p:txBody>
-          <a:bodyPr rtlCol="0" anchor="ctr"/>
-          <a:lstStyle/>
-          <a:p>
-            <a:pPr algn="ctr"/>
-            <a:endParaRPr lang="en-US"/>
-          </a:p>
-        </p:txBody>
-      </p:sp>
     </p:spTree>
     <p:extLst>
       <p:ext uri="{BB962C8B-B14F-4D97-AF65-F5344CB8AC3E}">
-        <p14:creationId xmlns:p14="http://schemas.microsoft.com/office/powerpoint/2010/main" val="24493764"/>
+        <p14:creationId xmlns:p14="http://schemas.microsoft.com/office/powerpoint/2010/main" val="335025673"/>
       </p:ext>
     </p:extLst>
   </p:cSld>
   <p:clrMapOvr>
     <a:masterClrMapping/>
   </p:clrMapOvr>
-  <p:timing>
-    <p:tnLst>
-      <p:par>
-        <p:cTn id="1" dur="indefinite" restart="never" nodeType="tmRoot"/>
-      </p:par>
-    </p:tnLst>
-  </p:timing>
 </p:sld>
 </file>
 
@@ -5062,7 +4762,7 @@
       </p:grpSpPr>
       <p:sp>
         <p:nvSpPr>
-          <p:cNvPr id="4" name="Title 1"/>
+          <p:cNvPr id="8" name="Title 1"/>
           <p:cNvSpPr>
             <a:spLocks noGrp="1"/>
           </p:cNvSpPr>
@@ -5076,16 +4776,15 @@
           <a:lstStyle/>
           <a:p>
             <a:r>
-              <a:rPr lang="en-US" dirty="0" smtClean="0"/>
+              <a:rPr lang="en-US" dirty="0"/>
               <a:t>Activity Lifecycle </a:t>
             </a:r>
-            <a:endParaRPr lang="en-US" dirty="0"/>
-          </a:p>
-        </p:txBody>
-      </p:sp>
-      <p:sp>
-        <p:nvSpPr>
-          <p:cNvPr id="6" name="TextBox 5"/>
+          </a:p>
+        </p:txBody>
+      </p:sp>
+      <p:sp>
+        <p:nvSpPr>
+          <p:cNvPr id="10" name="TextBox 9"/>
           <p:cNvSpPr txBox="1"/>
           <p:nvPr/>
         </p:nvSpPr>
@@ -5106,30 +4805,29 @@
           <a:lstStyle/>
           <a:p>
             <a:r>
-              <a:rPr lang="en-US" b="1" dirty="0" err="1" smtClean="0"/>
-              <a:t>onPause</a:t>
-            </a:r>
-            <a:r>
-              <a:rPr lang="en-US" b="1" dirty="0" smtClean="0"/>
+              <a:rPr lang="en-US" b="1" dirty="0" err="1"/>
+              <a:t>onResume</a:t>
+            </a:r>
+            <a:r>
+              <a:rPr lang="en-US" b="1" dirty="0"/>
               <a:t>() </a:t>
             </a:r>
             <a:r>
-              <a:rPr lang="en-US" dirty="0" smtClean="0"/>
-              <a:t>moving to the background, </a:t>
-            </a:r>
-          </a:p>
-          <a:p>
-            <a:r>
-              <a:rPr lang="en-US" dirty="0" smtClean="0"/>
-              <a:t>stopping user interaction</a:t>
-            </a:r>
-            <a:endParaRPr lang="en-US" dirty="0"/>
+              <a:rPr lang="en-US" dirty="0"/>
+              <a:t>in the foreground, </a:t>
+            </a:r>
+          </a:p>
+          <a:p>
+            <a:r>
+              <a:rPr lang="en-US" dirty="0"/>
+              <a:t>ready for interaction</a:t>
+            </a:r>
           </a:p>
         </p:txBody>
       </p:sp>
       <p:pic>
         <p:nvPicPr>
-          <p:cNvPr id="8" name="Content Placeholder 3"/>
+          <p:cNvPr id="7" name="Picture 6"/>
           <p:cNvPicPr>
             <a:picLocks noChangeAspect="1"/>
           </p:cNvPicPr>
@@ -5149,77 +4847,24 @@
         </p:blipFill>
         <p:spPr>
           <a:xfrm>
-            <a:off x="5523848" y="901998"/>
-            <a:ext cx="3943705" cy="5096836"/>
+            <a:off x="5167619" y="2553127"/>
+            <a:ext cx="6395207" cy="2764136"/>
           </a:xfrm>
           <a:prstGeom prst="rect">
             <a:avLst/>
           </a:prstGeom>
         </p:spPr>
       </p:pic>
-      <p:sp>
-        <p:nvSpPr>
-          <p:cNvPr id="7" name="Rectangle 6"/>
-          <p:cNvSpPr/>
-          <p:nvPr/>
-        </p:nvSpPr>
-        <p:spPr>
-          <a:xfrm>
-            <a:off x="6880564" y="3607721"/>
-            <a:ext cx="922614" cy="232410"/>
-          </a:xfrm>
-          <a:prstGeom prst="rect">
-            <a:avLst/>
-          </a:prstGeom>
-          <a:noFill/>
-          <a:ln w="38100">
-            <a:solidFill>
-              <a:srgbClr val="FF0000"/>
-            </a:solidFill>
-          </a:ln>
-        </p:spPr>
-        <p:style>
-          <a:lnRef idx="2">
-            <a:schemeClr val="accent1">
-              <a:shade val="50000"/>
-            </a:schemeClr>
-          </a:lnRef>
-          <a:fillRef idx="1">
-            <a:schemeClr val="accent1"/>
-          </a:fillRef>
-          <a:effectRef idx="0">
-            <a:schemeClr val="accent1"/>
-          </a:effectRef>
-          <a:fontRef idx="minor">
-            <a:schemeClr val="lt1"/>
-          </a:fontRef>
-        </p:style>
-        <p:txBody>
-          <a:bodyPr rtlCol="0" anchor="ctr"/>
-          <a:lstStyle/>
-          <a:p>
-            <a:pPr algn="ctr"/>
-            <a:endParaRPr lang="en-US"/>
-          </a:p>
-        </p:txBody>
-      </p:sp>
     </p:spTree>
     <p:extLst>
       <p:ext uri="{BB962C8B-B14F-4D97-AF65-F5344CB8AC3E}">
-        <p14:creationId xmlns:p14="http://schemas.microsoft.com/office/powerpoint/2010/main" val="534387049"/>
+        <p14:creationId xmlns:p14="http://schemas.microsoft.com/office/powerpoint/2010/main" val="24493764"/>
       </p:ext>
     </p:extLst>
   </p:cSld>
   <p:clrMapOvr>
     <a:masterClrMapping/>
   </p:clrMapOvr>
-  <p:timing>
-    <p:tnLst>
-      <p:par>
-        <p:cTn id="1" dur="indefinite" restart="never" nodeType="tmRoot"/>
-      </p:par>
-    </p:tnLst>
-  </p:timing>
 </p:sld>
 </file>
 
@@ -5256,10 +4901,9 @@
           <a:lstStyle/>
           <a:p>
             <a:r>
-              <a:rPr lang="en-US" dirty="0" smtClean="0"/>
+              <a:rPr lang="en-US" dirty="0"/>
               <a:t>Activity Lifecycle </a:t>
             </a:r>
-            <a:endParaRPr lang="en-US" dirty="0"/>
           </a:p>
         </p:txBody>
       </p:sp>
@@ -5272,7 +4916,7 @@
         <p:spPr>
           <a:xfrm>
             <a:off x="819645" y="1906796"/>
-            <a:ext cx="6222670" cy="369332"/>
+            <a:ext cx="6222670" cy="646331"/>
           </a:xfrm>
           <a:prstGeom prst="rect">
             <a:avLst/>
@@ -5286,24 +4930,29 @@
           <a:lstStyle/>
           <a:p>
             <a:r>
-              <a:rPr lang="en-US" b="1" dirty="0" err="1" smtClean="0"/>
-              <a:t>onStop</a:t>
-            </a:r>
-            <a:r>
-              <a:rPr lang="en-US" b="1" dirty="0" smtClean="0"/>
+              <a:rPr lang="en-US" b="1" dirty="0" err="1"/>
+              <a:t>onPause</a:t>
+            </a:r>
+            <a:r>
+              <a:rPr lang="en-US" b="1" dirty="0"/>
               <a:t>() </a:t>
             </a:r>
             <a:r>
-              <a:rPr lang="en-US" dirty="0" smtClean="0"/>
-              <a:t>moved to the background and not visible</a:t>
-            </a:r>
-            <a:endParaRPr lang="en-US" dirty="0"/>
+              <a:rPr lang="en-US" dirty="0"/>
+              <a:t>moving to the background, </a:t>
+            </a:r>
+          </a:p>
+          <a:p>
+            <a:r>
+              <a:rPr lang="en-US" dirty="0"/>
+              <a:t>stopping user interaction</a:t>
+            </a:r>
           </a:p>
         </p:txBody>
       </p:sp>
       <p:pic>
         <p:nvPicPr>
-          <p:cNvPr id="8" name="Content Placeholder 3"/>
+          <p:cNvPr id="9" name="Picture 8"/>
           <p:cNvPicPr>
             <a:picLocks noChangeAspect="1"/>
           </p:cNvPicPr>
@@ -5323,77 +4972,24 @@
         </p:blipFill>
         <p:spPr>
           <a:xfrm>
-            <a:off x="5523848" y="901998"/>
-            <a:ext cx="3943705" cy="5096836"/>
+            <a:off x="5167619" y="2553127"/>
+            <a:ext cx="6395207" cy="2764136"/>
           </a:xfrm>
           <a:prstGeom prst="rect">
             <a:avLst/>
           </a:prstGeom>
         </p:spPr>
       </p:pic>
-      <p:sp>
-        <p:nvSpPr>
-          <p:cNvPr id="7" name="Rectangle 6"/>
-          <p:cNvSpPr/>
-          <p:nvPr/>
-        </p:nvSpPr>
-        <p:spPr>
-          <a:xfrm>
-            <a:off x="6928064" y="4350671"/>
-            <a:ext cx="922614" cy="232410"/>
-          </a:xfrm>
-          <a:prstGeom prst="rect">
-            <a:avLst/>
-          </a:prstGeom>
-          <a:noFill/>
-          <a:ln w="38100">
-            <a:solidFill>
-              <a:srgbClr val="FF0000"/>
-            </a:solidFill>
-          </a:ln>
-        </p:spPr>
-        <p:style>
-          <a:lnRef idx="2">
-            <a:schemeClr val="accent1">
-              <a:shade val="50000"/>
-            </a:schemeClr>
-          </a:lnRef>
-          <a:fillRef idx="1">
-            <a:schemeClr val="accent1"/>
-          </a:fillRef>
-          <a:effectRef idx="0">
-            <a:schemeClr val="accent1"/>
-          </a:effectRef>
-          <a:fontRef idx="minor">
-            <a:schemeClr val="lt1"/>
-          </a:fontRef>
-        </p:style>
-        <p:txBody>
-          <a:bodyPr rtlCol="0" anchor="ctr"/>
-          <a:lstStyle/>
-          <a:p>
-            <a:pPr algn="ctr"/>
-            <a:endParaRPr lang="en-US"/>
-          </a:p>
-        </p:txBody>
-      </p:sp>
     </p:spTree>
     <p:extLst>
       <p:ext uri="{BB962C8B-B14F-4D97-AF65-F5344CB8AC3E}">
-        <p14:creationId xmlns:p14="http://schemas.microsoft.com/office/powerpoint/2010/main" val="1261053801"/>
+        <p14:creationId xmlns:p14="http://schemas.microsoft.com/office/powerpoint/2010/main" val="534387049"/>
       </p:ext>
     </p:extLst>
   </p:cSld>
   <p:clrMapOvr>
     <a:masterClrMapping/>
   </p:clrMapOvr>
-  <p:timing>
-    <p:tnLst>
-      <p:par>
-        <p:cTn id="1" dur="indefinite" restart="never" nodeType="tmRoot"/>
-      </p:par>
-    </p:tnLst>
-  </p:timing>
 </p:sld>
 </file>
 
@@ -5430,10 +5026,9 @@
           <a:lstStyle/>
           <a:p>
             <a:r>
-              <a:rPr lang="en-US" dirty="0" smtClean="0"/>
+              <a:rPr lang="en-US" dirty="0"/>
               <a:t>Activity Lifecycle </a:t>
             </a:r>
-            <a:endParaRPr lang="en-US" dirty="0"/>
           </a:p>
         </p:txBody>
       </p:sp>
@@ -5446,7 +5041,7 @@
         <p:spPr>
           <a:xfrm>
             <a:off x="819645" y="1906796"/>
-            <a:ext cx="6222670" cy="369332"/>
+            <a:ext cx="6222670" cy="646331"/>
           </a:xfrm>
           <a:prstGeom prst="rect">
             <a:avLst/>
@@ -5460,24 +5055,29 @@
           <a:lstStyle/>
           <a:p>
             <a:r>
-              <a:rPr lang="en-US" b="1" dirty="0" err="1" smtClean="0"/>
-              <a:t>onDestroy</a:t>
-            </a:r>
-            <a:r>
-              <a:rPr lang="en-US" b="1" dirty="0" smtClean="0"/>
+              <a:rPr lang="en-US" b="1" dirty="0" err="1"/>
+              <a:t>onStop</a:t>
+            </a:r>
+            <a:r>
+              <a:rPr lang="en-US" b="1" dirty="0"/>
               <a:t>() </a:t>
             </a:r>
             <a:r>
-              <a:rPr lang="en-US" dirty="0" smtClean="0"/>
-              <a:t>moved to the background and not visible</a:t>
-            </a:r>
-            <a:endParaRPr lang="en-US" dirty="0"/>
+              <a:rPr lang="en-US" dirty="0"/>
+              <a:t>moved to the background </a:t>
+            </a:r>
+          </a:p>
+          <a:p>
+            <a:r>
+              <a:rPr lang="en-US" dirty="0"/>
+              <a:t>and not visible</a:t>
+            </a:r>
           </a:p>
         </p:txBody>
       </p:sp>
       <p:pic>
         <p:nvPicPr>
-          <p:cNvPr id="8" name="Content Placeholder 3"/>
+          <p:cNvPr id="9" name="Picture 8"/>
           <p:cNvPicPr>
             <a:picLocks noChangeAspect="1"/>
           </p:cNvPicPr>
@@ -5497,77 +5097,24 @@
         </p:blipFill>
         <p:spPr>
           <a:xfrm>
-            <a:off x="5523848" y="901998"/>
-            <a:ext cx="3943705" cy="5096836"/>
+            <a:off x="5167619" y="2553127"/>
+            <a:ext cx="6395207" cy="2764136"/>
           </a:xfrm>
           <a:prstGeom prst="rect">
             <a:avLst/>
           </a:prstGeom>
         </p:spPr>
       </p:pic>
-      <p:sp>
-        <p:nvSpPr>
-          <p:cNvPr id="7" name="Rectangle 6"/>
-          <p:cNvSpPr/>
-          <p:nvPr/>
-        </p:nvSpPr>
-        <p:spPr>
-          <a:xfrm>
-            <a:off x="6868688" y="5110321"/>
-            <a:ext cx="922614" cy="232410"/>
-          </a:xfrm>
-          <a:prstGeom prst="rect">
-            <a:avLst/>
-          </a:prstGeom>
-          <a:noFill/>
-          <a:ln w="38100">
-            <a:solidFill>
-              <a:srgbClr val="FF0000"/>
-            </a:solidFill>
-          </a:ln>
-        </p:spPr>
-        <p:style>
-          <a:lnRef idx="2">
-            <a:schemeClr val="accent1">
-              <a:shade val="50000"/>
-            </a:schemeClr>
-          </a:lnRef>
-          <a:fillRef idx="1">
-            <a:schemeClr val="accent1"/>
-          </a:fillRef>
-          <a:effectRef idx="0">
-            <a:schemeClr val="accent1"/>
-          </a:effectRef>
-          <a:fontRef idx="minor">
-            <a:schemeClr val="lt1"/>
-          </a:fontRef>
-        </p:style>
-        <p:txBody>
-          <a:bodyPr rtlCol="0" anchor="ctr"/>
-          <a:lstStyle/>
-          <a:p>
-            <a:pPr algn="ctr"/>
-            <a:endParaRPr lang="en-US"/>
-          </a:p>
-        </p:txBody>
-      </p:sp>
     </p:spTree>
     <p:extLst>
       <p:ext uri="{BB962C8B-B14F-4D97-AF65-F5344CB8AC3E}">
-        <p14:creationId xmlns:p14="http://schemas.microsoft.com/office/powerpoint/2010/main" val="1338317668"/>
+        <p14:creationId xmlns:p14="http://schemas.microsoft.com/office/powerpoint/2010/main" val="1261053801"/>
       </p:ext>
     </p:extLst>
   </p:cSld>
   <p:clrMapOvr>
     <a:masterClrMapping/>
   </p:clrMapOvr>
-  <p:timing>
-    <p:tnLst>
-      <p:par>
-        <p:cTn id="1" dur="indefinite" restart="never" nodeType="tmRoot"/>
-      </p:par>
-    </p:tnLst>
-  </p:timing>
 </p:sld>
 </file>
 
@@ -5604,10 +5151,9 @@
           <a:lstStyle/>
           <a:p>
             <a:r>
-              <a:rPr lang="en-US" dirty="0" smtClean="0"/>
+              <a:rPr lang="en-US" dirty="0"/>
               <a:t>Goals</a:t>
             </a:r>
-            <a:endParaRPr lang="en-US" dirty="0"/>
           </a:p>
         </p:txBody>
       </p:sp>
@@ -5627,18 +5173,17 @@
           <a:lstStyle/>
           <a:p>
             <a:r>
-              <a:rPr lang="en-US" dirty="0" smtClean="0"/>
+              <a:rPr lang="en-US" dirty="0"/>
               <a:t>Develop a </a:t>
             </a:r>
             <a:r>
-              <a:rPr lang="en-US" dirty="0" err="1" smtClean="0"/>
+              <a:rPr lang="en-US" dirty="0" err="1"/>
               <a:t>BlueSkies</a:t>
             </a:r>
             <a:r>
-              <a:rPr lang="en-US" dirty="0" smtClean="0"/>
+              <a:rPr lang="en-US" dirty="0"/>
               <a:t> App</a:t>
             </a:r>
-            <a:endParaRPr lang="en-US" dirty="0"/>
           </a:p>
         </p:txBody>
       </p:sp>
@@ -5682,13 +5227,6 @@
   <p:clrMapOvr>
     <a:masterClrMapping/>
   </p:clrMapOvr>
-  <p:timing>
-    <p:tnLst>
-      <p:par>
-        <p:cTn id="1" dur="indefinite" restart="never" nodeType="tmRoot"/>
-      </p:par>
-    </p:tnLst>
-  </p:timing>
 </p:sld>
 </file>
 
@@ -5725,10 +5263,9 @@
           <a:lstStyle/>
           <a:p>
             <a:r>
-              <a:rPr lang="en-US" dirty="0" smtClean="0"/>
+              <a:rPr lang="en-US" dirty="0"/>
               <a:t>Activity Lifecycle </a:t>
             </a:r>
-            <a:endParaRPr lang="en-US" dirty="0"/>
           </a:p>
         </p:txBody>
       </p:sp>
@@ -5741,7 +5278,7 @@
         <p:spPr>
           <a:xfrm>
             <a:off x="819645" y="1906796"/>
-            <a:ext cx="6222670" cy="369332"/>
+            <a:ext cx="6222670" cy="646331"/>
           </a:xfrm>
           <a:prstGeom prst="rect">
             <a:avLst/>
@@ -5755,24 +5292,29 @@
           <a:lstStyle/>
           <a:p>
             <a:r>
-              <a:rPr lang="en-US" b="1" dirty="0" err="1" smtClean="0"/>
-              <a:t>onRestart</a:t>
-            </a:r>
-            <a:r>
-              <a:rPr lang="en-US" b="1" dirty="0" smtClean="0"/>
+              <a:rPr lang="en-US" b="1" dirty="0" err="1"/>
+              <a:t>onDestroy</a:t>
+            </a:r>
+            <a:r>
+              <a:rPr lang="en-US" b="1" dirty="0"/>
               <a:t>() </a:t>
             </a:r>
             <a:r>
-              <a:rPr lang="en-US" dirty="0" smtClean="0"/>
-              <a:t>activity is stopped, then started again</a:t>
-            </a:r>
-            <a:endParaRPr lang="en-US" dirty="0"/>
+              <a:rPr lang="en-US" dirty="0"/>
+              <a:t>moved to the background </a:t>
+            </a:r>
+          </a:p>
+          <a:p>
+            <a:r>
+              <a:rPr lang="en-US" dirty="0"/>
+              <a:t>and not visible</a:t>
+            </a:r>
           </a:p>
         </p:txBody>
       </p:sp>
       <p:pic>
         <p:nvPicPr>
-          <p:cNvPr id="8" name="Content Placeholder 3"/>
+          <p:cNvPr id="9" name="Picture 8"/>
           <p:cNvPicPr>
             <a:picLocks noChangeAspect="1"/>
           </p:cNvPicPr>
@@ -5792,77 +5334,24 @@
         </p:blipFill>
         <p:spPr>
           <a:xfrm>
-            <a:off x="5523848" y="901998"/>
-            <a:ext cx="3943705" cy="5096836"/>
+            <a:off x="5167619" y="2553127"/>
+            <a:ext cx="6395207" cy="2764136"/>
           </a:xfrm>
           <a:prstGeom prst="rect">
             <a:avLst/>
           </a:prstGeom>
         </p:spPr>
       </p:pic>
-      <p:sp>
-        <p:nvSpPr>
-          <p:cNvPr id="7" name="Rectangle 6"/>
-          <p:cNvSpPr/>
-          <p:nvPr/>
-        </p:nvSpPr>
-        <p:spPr>
-          <a:xfrm>
-            <a:off x="8533064" y="1915707"/>
-            <a:ext cx="922614" cy="232410"/>
-          </a:xfrm>
-          <a:prstGeom prst="rect">
-            <a:avLst/>
-          </a:prstGeom>
-          <a:noFill/>
-          <a:ln w="38100">
-            <a:solidFill>
-              <a:srgbClr val="FF0000"/>
-            </a:solidFill>
-          </a:ln>
-        </p:spPr>
-        <p:style>
-          <a:lnRef idx="2">
-            <a:schemeClr val="accent1">
-              <a:shade val="50000"/>
-            </a:schemeClr>
-          </a:lnRef>
-          <a:fillRef idx="1">
-            <a:schemeClr val="accent1"/>
-          </a:fillRef>
-          <a:effectRef idx="0">
-            <a:schemeClr val="accent1"/>
-          </a:effectRef>
-          <a:fontRef idx="minor">
-            <a:schemeClr val="lt1"/>
-          </a:fontRef>
-        </p:style>
-        <p:txBody>
-          <a:bodyPr rtlCol="0" anchor="ctr"/>
-          <a:lstStyle/>
-          <a:p>
-            <a:pPr algn="ctr"/>
-            <a:endParaRPr lang="en-US"/>
-          </a:p>
-        </p:txBody>
-      </p:sp>
     </p:spTree>
     <p:extLst>
       <p:ext uri="{BB962C8B-B14F-4D97-AF65-F5344CB8AC3E}">
-        <p14:creationId xmlns:p14="http://schemas.microsoft.com/office/powerpoint/2010/main" val="3335284568"/>
+        <p14:creationId xmlns:p14="http://schemas.microsoft.com/office/powerpoint/2010/main" val="1338317668"/>
       </p:ext>
     </p:extLst>
   </p:cSld>
   <p:clrMapOvr>
     <a:masterClrMapping/>
   </p:clrMapOvr>
-  <p:timing>
-    <p:tnLst>
-      <p:par>
-        <p:cTn id="1" dur="indefinite" restart="never" nodeType="tmRoot"/>
-      </p:par>
-    </p:tnLst>
-  </p:timing>
 </p:sld>
 </file>
 
@@ -5899,10 +5388,9 @@
           <a:lstStyle/>
           <a:p>
             <a:r>
-              <a:rPr lang="en-US" dirty="0" smtClean="0"/>
+              <a:rPr lang="en-US" dirty="0"/>
               <a:t>Activity Lifecycle counterparts</a:t>
             </a:r>
-            <a:endParaRPr lang="en-US" dirty="0"/>
           </a:p>
         </p:txBody>
       </p:sp>
@@ -5955,18 +5443,13 @@
           <a:p>
             <a:pPr algn="ctr"/>
             <a:r>
-              <a:rPr lang="en-US" dirty="0" smtClean="0">
+              <a:rPr lang="en-US" dirty="0">
                 <a:solidFill>
                   <a:schemeClr val="tx1"/>
                 </a:solidFill>
               </a:rPr>
               <a:t>OnCreate()</a:t>
             </a:r>
-            <a:endParaRPr lang="en-US" dirty="0">
-              <a:solidFill>
-                <a:schemeClr val="tx1"/>
-              </a:solidFill>
-            </a:endParaRPr>
           </a:p>
         </p:txBody>
       </p:sp>
@@ -6019,7 +5502,7 @@
           <a:p>
             <a:pPr algn="ctr"/>
             <a:r>
-              <a:rPr lang="en-US" dirty="0" err="1" smtClean="0">
+              <a:rPr lang="en-US" dirty="0" err="1">
                 <a:solidFill>
                   <a:schemeClr val="tx1"/>
                 </a:solidFill>
@@ -6027,18 +5510,13 @@
               <a:t>OnDestroy</a:t>
             </a:r>
             <a:r>
-              <a:rPr lang="en-US" dirty="0" smtClean="0">
+              <a:rPr lang="en-US" dirty="0">
                 <a:solidFill>
                   <a:schemeClr val="tx1"/>
                 </a:solidFill>
               </a:rPr>
               <a:t>()</a:t>
             </a:r>
-            <a:endParaRPr lang="en-US" dirty="0">
-              <a:solidFill>
-                <a:schemeClr val="tx1"/>
-              </a:solidFill>
-            </a:endParaRPr>
           </a:p>
         </p:txBody>
       </p:sp>
@@ -6091,7 +5569,7 @@
           <a:p>
             <a:pPr algn="ctr"/>
             <a:r>
-              <a:rPr lang="en-US" dirty="0" err="1" smtClean="0">
+              <a:rPr lang="en-US" dirty="0" err="1">
                 <a:solidFill>
                   <a:schemeClr val="tx1"/>
                 </a:solidFill>
@@ -6099,18 +5577,13 @@
               <a:t>onStart</a:t>
             </a:r>
             <a:r>
-              <a:rPr lang="en-US" dirty="0" smtClean="0">
+              <a:rPr lang="en-US" dirty="0">
                 <a:solidFill>
                   <a:schemeClr val="tx1"/>
                 </a:solidFill>
               </a:rPr>
               <a:t>()</a:t>
             </a:r>
-            <a:endParaRPr lang="en-US" dirty="0">
-              <a:solidFill>
-                <a:schemeClr val="tx1"/>
-              </a:solidFill>
-            </a:endParaRPr>
           </a:p>
         </p:txBody>
       </p:sp>
@@ -6163,7 +5636,7 @@
           <a:p>
             <a:pPr algn="ctr"/>
             <a:r>
-              <a:rPr lang="en-US" dirty="0" err="1" smtClean="0">
+              <a:rPr lang="en-US" dirty="0" err="1">
                 <a:solidFill>
                   <a:schemeClr val="tx1"/>
                 </a:solidFill>
@@ -6171,18 +5644,13 @@
               <a:t>onStop</a:t>
             </a:r>
             <a:r>
-              <a:rPr lang="en-US" dirty="0" smtClean="0">
+              <a:rPr lang="en-US" dirty="0">
                 <a:solidFill>
                   <a:schemeClr val="tx1"/>
                 </a:solidFill>
               </a:rPr>
               <a:t>()</a:t>
             </a:r>
-            <a:endParaRPr lang="en-US" dirty="0">
-              <a:solidFill>
-                <a:schemeClr val="tx1"/>
-              </a:solidFill>
-            </a:endParaRPr>
           </a:p>
         </p:txBody>
       </p:sp>
@@ -6235,7 +5703,7 @@
           <a:p>
             <a:pPr algn="ctr"/>
             <a:r>
-              <a:rPr lang="en-US" dirty="0" err="1" smtClean="0">
+              <a:rPr lang="en-US" dirty="0" err="1">
                 <a:solidFill>
                   <a:schemeClr val="tx1"/>
                 </a:solidFill>
@@ -6243,18 +5711,13 @@
               <a:t>onResume</a:t>
             </a:r>
             <a:r>
-              <a:rPr lang="en-US" dirty="0" smtClean="0">
+              <a:rPr lang="en-US" dirty="0">
                 <a:solidFill>
                   <a:schemeClr val="tx1"/>
                 </a:solidFill>
               </a:rPr>
               <a:t>()</a:t>
             </a:r>
-            <a:endParaRPr lang="en-US" dirty="0">
-              <a:solidFill>
-                <a:schemeClr val="tx1"/>
-              </a:solidFill>
-            </a:endParaRPr>
           </a:p>
         </p:txBody>
       </p:sp>
@@ -6307,7 +5770,7 @@
           <a:p>
             <a:pPr algn="ctr"/>
             <a:r>
-              <a:rPr lang="en-US" dirty="0" err="1" smtClean="0">
+              <a:rPr lang="en-US" dirty="0" err="1">
                 <a:solidFill>
                   <a:schemeClr val="tx1"/>
                 </a:solidFill>
@@ -6315,18 +5778,13 @@
               <a:t>onPause</a:t>
             </a:r>
             <a:r>
-              <a:rPr lang="en-US" dirty="0" smtClean="0">
+              <a:rPr lang="en-US" dirty="0">
                 <a:solidFill>
                   <a:schemeClr val="tx1"/>
                 </a:solidFill>
               </a:rPr>
               <a:t>()</a:t>
             </a:r>
-            <a:endParaRPr lang="en-US" dirty="0">
-              <a:solidFill>
-                <a:schemeClr val="tx1"/>
-              </a:solidFill>
-            </a:endParaRPr>
           </a:p>
         </p:txBody>
       </p:sp>
@@ -6460,17 +5918,183 @@
   <p:clrMapOvr>
     <a:masterClrMapping/>
   </p:clrMapOvr>
-  <p:timing>
-    <p:tnLst>
-      <p:par>
-        <p:cTn id="1" dur="indefinite" restart="never" nodeType="tmRoot"/>
-      </p:par>
-    </p:tnLst>
-  </p:timing>
 </p:sld>
 </file>
 
 <file path=ppt/slides/slide22.xml><?xml version="1.0" encoding="utf-8"?>
+<p:sld xmlns:a="http://schemas.openxmlformats.org/drawingml/2006/main" xmlns:r="http://schemas.openxmlformats.org/officeDocument/2006/relationships" xmlns:p="http://schemas.openxmlformats.org/presentationml/2006/main" show="0">
+  <p:cSld>
+    <p:spTree>
+      <p:nvGrpSpPr>
+        <p:cNvPr id="1" name=""/>
+        <p:cNvGrpSpPr/>
+        <p:nvPr/>
+      </p:nvGrpSpPr>
+      <p:grpSpPr>
+        <a:xfrm>
+          <a:off x="0" y="0"/>
+          <a:ext cx="0" cy="0"/>
+          <a:chOff x="0" y="0"/>
+          <a:chExt cx="0" cy="0"/>
+        </a:xfrm>
+      </p:grpSpPr>
+      <p:sp>
+        <p:nvSpPr>
+          <p:cNvPr id="4" name="Title 1"/>
+          <p:cNvSpPr>
+            <a:spLocks noGrp="1"/>
+          </p:cNvSpPr>
+          <p:nvPr>
+            <p:ph type="title"/>
+          </p:nvPr>
+        </p:nvSpPr>
+        <p:spPr/>
+        <p:txBody>
+          <a:bodyPr/>
+          <a:lstStyle/>
+          <a:p>
+            <a:r>
+              <a:rPr lang="en-US" dirty="0"/>
+              <a:t>Activity Lifecycle </a:t>
+            </a:r>
+          </a:p>
+        </p:txBody>
+      </p:sp>
+      <p:sp>
+        <p:nvSpPr>
+          <p:cNvPr id="6" name="TextBox 5"/>
+          <p:cNvSpPr txBox="1"/>
+          <p:nvPr/>
+        </p:nvSpPr>
+        <p:spPr>
+          <a:xfrm>
+            <a:off x="819645" y="1906796"/>
+            <a:ext cx="6222670" cy="369332"/>
+          </a:xfrm>
+          <a:prstGeom prst="rect">
+            <a:avLst/>
+          </a:prstGeom>
+          <a:noFill/>
+        </p:spPr>
+        <p:txBody>
+          <a:bodyPr wrap="square" rtlCol="0">
+            <a:spAutoFit/>
+          </a:bodyPr>
+          <a:lstStyle/>
+          <a:p>
+            <a:r>
+              <a:rPr lang="en-US" b="1" dirty="0" err="1"/>
+              <a:t>onRestart</a:t>
+            </a:r>
+            <a:r>
+              <a:rPr lang="en-US" b="1" dirty="0"/>
+              <a:t>() </a:t>
+            </a:r>
+            <a:r>
+              <a:rPr lang="en-US" dirty="0"/>
+              <a:t>activity is </a:t>
+            </a:r>
+            <a:r>
+              <a:rPr lang="en-US" dirty="0" err="1"/>
+              <a:t>stoppd</a:t>
+            </a:r>
+            <a:r>
+              <a:rPr lang="en-US" dirty="0"/>
+              <a:t>, then started again</a:t>
+            </a:r>
+          </a:p>
+        </p:txBody>
+      </p:sp>
+      <p:pic>
+        <p:nvPicPr>
+          <p:cNvPr id="8" name="Content Placeholder 3"/>
+          <p:cNvPicPr>
+            <a:picLocks noChangeAspect="1"/>
+          </p:cNvPicPr>
+          <p:nvPr/>
+        </p:nvPicPr>
+        <p:blipFill>
+          <a:blip r:embed="rId2">
+            <a:extLst>
+              <a:ext uri="{28A0092B-C50C-407E-A947-70E740481C1C}">
+                <a14:useLocalDpi xmlns:a14="http://schemas.microsoft.com/office/drawing/2010/main" val="0"/>
+              </a:ext>
+            </a:extLst>
+          </a:blip>
+          <a:stretch>
+            <a:fillRect/>
+          </a:stretch>
+        </p:blipFill>
+        <p:spPr>
+          <a:xfrm>
+            <a:off x="5523848" y="901998"/>
+            <a:ext cx="3943705" cy="5096836"/>
+          </a:xfrm>
+          <a:prstGeom prst="rect">
+            <a:avLst/>
+          </a:prstGeom>
+        </p:spPr>
+      </p:pic>
+      <p:sp>
+        <p:nvSpPr>
+          <p:cNvPr id="7" name="Rectangle 6"/>
+          <p:cNvSpPr/>
+          <p:nvPr/>
+        </p:nvSpPr>
+        <p:spPr>
+          <a:xfrm>
+            <a:off x="8533064" y="1915707"/>
+            <a:ext cx="922614" cy="232410"/>
+          </a:xfrm>
+          <a:prstGeom prst="rect">
+            <a:avLst/>
+          </a:prstGeom>
+          <a:noFill/>
+          <a:ln w="38100">
+            <a:solidFill>
+              <a:srgbClr val="FF0000"/>
+            </a:solidFill>
+          </a:ln>
+        </p:spPr>
+        <p:style>
+          <a:lnRef idx="2">
+            <a:schemeClr val="accent1">
+              <a:shade val="50000"/>
+            </a:schemeClr>
+          </a:lnRef>
+          <a:fillRef idx="1">
+            <a:schemeClr val="accent1"/>
+          </a:fillRef>
+          <a:effectRef idx="0">
+            <a:schemeClr val="accent1"/>
+          </a:effectRef>
+          <a:fontRef idx="minor">
+            <a:schemeClr val="lt1"/>
+          </a:fontRef>
+        </p:style>
+        <p:txBody>
+          <a:bodyPr rtlCol="0" anchor="ctr"/>
+          <a:lstStyle/>
+          <a:p>
+            <a:pPr algn="ctr"/>
+            <a:endParaRPr lang="en-US"/>
+          </a:p>
+        </p:txBody>
+      </p:sp>
+    </p:spTree>
+    <p:extLst>
+      <p:ext uri="{BB962C8B-B14F-4D97-AF65-F5344CB8AC3E}">
+        <p14:creationId xmlns:p14="http://schemas.microsoft.com/office/powerpoint/2010/main" val="3335284568"/>
+      </p:ext>
+    </p:extLst>
+  </p:cSld>
+  <p:clrMapOvr>
+    <a:masterClrMapping/>
+  </p:clrMapOvr>
+</p:sld>
+</file>
+
+<file path=ppt/slides/slide23.xml><?xml version="1.0" encoding="utf-8"?>
 <p:sld xmlns:a="http://schemas.openxmlformats.org/drawingml/2006/main" xmlns:r="http://schemas.openxmlformats.org/officeDocument/2006/relationships" xmlns:p="http://schemas.openxmlformats.org/presentationml/2006/main">
   <p:cSld>
     <p:spTree>
@@ -6503,7 +6127,240 @@
           <a:lstStyle/>
           <a:p>
             <a:r>
-              <a:rPr lang="en-US" dirty="0" err="1" smtClean="0"/>
+              <a:rPr lang="en-US" dirty="0"/>
+              <a:t>Hitting back </a:t>
+            </a:r>
+          </a:p>
+        </p:txBody>
+      </p:sp>
+      <p:sp>
+        <p:nvSpPr>
+          <p:cNvPr id="3" name="Content Placeholder 2"/>
+          <p:cNvSpPr>
+            <a:spLocks noGrp="1"/>
+          </p:cNvSpPr>
+          <p:nvPr>
+            <p:ph idx="1"/>
+          </p:nvPr>
+        </p:nvSpPr>
+        <p:spPr/>
+        <p:txBody>
+          <a:bodyPr/>
+          <a:lstStyle/>
+          <a:p>
+            <a:r>
+              <a:rPr lang="en-US" dirty="0" err="1"/>
+              <a:t>onDestroy</a:t>
+            </a:r>
+            <a:r>
+              <a:rPr lang="en-US" dirty="0"/>
+              <a:t>()</a:t>
+            </a:r>
+          </a:p>
+        </p:txBody>
+      </p:sp>
+    </p:spTree>
+    <p:extLst>
+      <p:ext uri="{BB962C8B-B14F-4D97-AF65-F5344CB8AC3E}">
+        <p14:creationId xmlns:p14="http://schemas.microsoft.com/office/powerpoint/2010/main" val="679222727"/>
+      </p:ext>
+    </p:extLst>
+  </p:cSld>
+  <p:clrMapOvr>
+    <a:masterClrMapping/>
+  </p:clrMapOvr>
+</p:sld>
+</file>
+
+<file path=ppt/slides/slide24.xml><?xml version="1.0" encoding="utf-8"?>
+<p:sld xmlns:a="http://schemas.openxmlformats.org/drawingml/2006/main" xmlns:r="http://schemas.openxmlformats.org/officeDocument/2006/relationships" xmlns:p="http://schemas.openxmlformats.org/presentationml/2006/main">
+  <p:cSld>
+    <p:spTree>
+      <p:nvGrpSpPr>
+        <p:cNvPr id="1" name=""/>
+        <p:cNvGrpSpPr/>
+        <p:nvPr/>
+      </p:nvGrpSpPr>
+      <p:grpSpPr>
+        <a:xfrm>
+          <a:off x="0" y="0"/>
+          <a:ext cx="0" cy="0"/>
+          <a:chOff x="0" y="0"/>
+          <a:chExt cx="0" cy="0"/>
+        </a:xfrm>
+      </p:grpSpPr>
+      <p:sp>
+        <p:nvSpPr>
+          <p:cNvPr id="2" name="Title 1"/>
+          <p:cNvSpPr>
+            <a:spLocks noGrp="1"/>
+          </p:cNvSpPr>
+          <p:nvPr>
+            <p:ph type="title"/>
+          </p:nvPr>
+        </p:nvSpPr>
+        <p:spPr/>
+        <p:txBody>
+          <a:bodyPr/>
+          <a:lstStyle/>
+          <a:p>
+            <a:r>
+              <a:rPr lang="en-US" dirty="0"/>
+              <a:t>Home button</a:t>
+            </a:r>
+          </a:p>
+        </p:txBody>
+      </p:sp>
+      <p:sp>
+        <p:nvSpPr>
+          <p:cNvPr id="3" name="Content Placeholder 2"/>
+          <p:cNvSpPr>
+            <a:spLocks noGrp="1"/>
+          </p:cNvSpPr>
+          <p:nvPr>
+            <p:ph idx="1"/>
+          </p:nvPr>
+        </p:nvSpPr>
+        <p:spPr/>
+        <p:txBody>
+          <a:bodyPr/>
+          <a:lstStyle/>
+          <a:p>
+            <a:r>
+              <a:rPr lang="en-US" dirty="0"/>
+              <a:t>Stopped</a:t>
+            </a:r>
+          </a:p>
+        </p:txBody>
+      </p:sp>
+    </p:spTree>
+    <p:extLst>
+      <p:ext uri="{BB962C8B-B14F-4D97-AF65-F5344CB8AC3E}">
+        <p14:creationId xmlns:p14="http://schemas.microsoft.com/office/powerpoint/2010/main" val="2378621501"/>
+      </p:ext>
+    </p:extLst>
+  </p:cSld>
+  <p:clrMapOvr>
+    <a:masterClrMapping/>
+  </p:clrMapOvr>
+</p:sld>
+</file>
+
+<file path=ppt/slides/slide25.xml><?xml version="1.0" encoding="utf-8"?>
+<p:sld xmlns:a="http://schemas.openxmlformats.org/drawingml/2006/main" xmlns:r="http://schemas.openxmlformats.org/officeDocument/2006/relationships" xmlns:p="http://schemas.openxmlformats.org/presentationml/2006/main">
+  <p:cSld>
+    <p:spTree>
+      <p:nvGrpSpPr>
+        <p:cNvPr id="1" name=""/>
+        <p:cNvGrpSpPr/>
+        <p:nvPr/>
+      </p:nvGrpSpPr>
+      <p:grpSpPr>
+        <a:xfrm>
+          <a:off x="0" y="0"/>
+          <a:ext cx="0" cy="0"/>
+          <a:chOff x="0" y="0"/>
+          <a:chExt cx="0" cy="0"/>
+        </a:xfrm>
+      </p:grpSpPr>
+      <p:sp>
+        <p:nvSpPr>
+          <p:cNvPr id="2" name="Title 1"/>
+          <p:cNvSpPr>
+            <a:spLocks noGrp="1"/>
+          </p:cNvSpPr>
+          <p:nvPr>
+            <p:ph type="title"/>
+          </p:nvPr>
+        </p:nvSpPr>
+        <p:spPr/>
+        <p:txBody>
+          <a:bodyPr/>
+          <a:lstStyle/>
+          <a:p>
+            <a:r>
+              <a:rPr lang="en-US" dirty="0" err="1"/>
+              <a:t>SavedInstanceState</a:t>
+            </a:r>
+            <a:endParaRPr lang="en-US" dirty="0"/>
+          </a:p>
+        </p:txBody>
+      </p:sp>
+      <p:sp>
+        <p:nvSpPr>
+          <p:cNvPr id="3" name="Content Placeholder 2"/>
+          <p:cNvSpPr>
+            <a:spLocks noGrp="1"/>
+          </p:cNvSpPr>
+          <p:nvPr>
+            <p:ph idx="1"/>
+          </p:nvPr>
+        </p:nvSpPr>
+        <p:spPr/>
+        <p:txBody>
+          <a:bodyPr/>
+          <a:lstStyle/>
+          <a:p>
+            <a:r>
+              <a:rPr lang="en-US" dirty="0"/>
+              <a:t>On Rotation</a:t>
+            </a:r>
+          </a:p>
+          <a:p>
+            <a:r>
+              <a:rPr lang="en-US" dirty="0"/>
+              <a:t>App is killed</a:t>
+            </a:r>
+          </a:p>
+        </p:txBody>
+      </p:sp>
+    </p:spTree>
+    <p:extLst>
+      <p:ext uri="{BB962C8B-B14F-4D97-AF65-F5344CB8AC3E}">
+        <p14:creationId xmlns:p14="http://schemas.microsoft.com/office/powerpoint/2010/main" val="992913506"/>
+      </p:ext>
+    </p:extLst>
+  </p:cSld>
+  <p:clrMapOvr>
+    <a:masterClrMapping/>
+  </p:clrMapOvr>
+</p:sld>
+</file>
+
+<file path=ppt/slides/slide26.xml><?xml version="1.0" encoding="utf-8"?>
+<p:sld xmlns:a="http://schemas.openxmlformats.org/drawingml/2006/main" xmlns:r="http://schemas.openxmlformats.org/officeDocument/2006/relationships" xmlns:p="http://schemas.openxmlformats.org/presentationml/2006/main">
+  <p:cSld>
+    <p:spTree>
+      <p:nvGrpSpPr>
+        <p:cNvPr id="1" name=""/>
+        <p:cNvGrpSpPr/>
+        <p:nvPr/>
+      </p:nvGrpSpPr>
+      <p:grpSpPr>
+        <a:xfrm>
+          <a:off x="0" y="0"/>
+          <a:ext cx="0" cy="0"/>
+          <a:chOff x="0" y="0"/>
+          <a:chExt cx="0" cy="0"/>
+        </a:xfrm>
+      </p:grpSpPr>
+      <p:sp>
+        <p:nvSpPr>
+          <p:cNvPr id="2" name="Title 1"/>
+          <p:cNvSpPr>
+            <a:spLocks noGrp="1"/>
+          </p:cNvSpPr>
+          <p:nvPr>
+            <p:ph type="title"/>
+          </p:nvPr>
+        </p:nvSpPr>
+        <p:spPr/>
+        <p:txBody>
+          <a:bodyPr/>
+          <a:lstStyle/>
+          <a:p>
+            <a:r>
+              <a:rPr lang="en-US" dirty="0" err="1"/>
               <a:t>Github</a:t>
             </a:r>
             <a:endParaRPr lang="en-US" dirty="0"/>
@@ -6539,13 +6396,6 @@
   <p:clrMapOvr>
     <a:masterClrMapping/>
   </p:clrMapOvr>
-  <p:timing>
-    <p:tnLst>
-      <p:par>
-        <p:cTn id="1" dur="indefinite" restart="never" nodeType="tmRoot"/>
-      </p:par>
-    </p:tnLst>
-  </p:timing>
 </p:sld>
 </file>
 
@@ -6582,10 +6432,9 @@
           <a:lstStyle/>
           <a:p>
             <a:r>
-              <a:rPr lang="en-US" dirty="0" smtClean="0"/>
+              <a:rPr lang="en-US" dirty="0"/>
               <a:t>Agenda</a:t>
             </a:r>
-            <a:endParaRPr lang="en-US" dirty="0"/>
           </a:p>
         </p:txBody>
       </p:sp>
@@ -6607,73 +6456,73 @@
           <a:lstStyle/>
           <a:p>
             <a:r>
-              <a:rPr lang="en-US" dirty="0" smtClean="0"/>
+              <a:rPr lang="en-US" dirty="0"/>
               <a:t>High Level </a:t>
             </a:r>
           </a:p>
           <a:p>
             <a:pPr lvl="1"/>
             <a:r>
-              <a:rPr lang="en-US" dirty="0" smtClean="0"/>
+              <a:rPr lang="en-US" dirty="0"/>
               <a:t>Android Studio </a:t>
             </a:r>
           </a:p>
           <a:p>
             <a:pPr lvl="2"/>
             <a:r>
-              <a:rPr lang="en-US" dirty="0" smtClean="0"/>
+              <a:rPr lang="en-US" dirty="0"/>
               <a:t>Overview</a:t>
             </a:r>
           </a:p>
           <a:p>
             <a:pPr lvl="1"/>
             <a:r>
-              <a:rPr lang="en-US" dirty="0" smtClean="0"/>
+              <a:rPr lang="en-US" dirty="0"/>
               <a:t>Activity </a:t>
             </a:r>
           </a:p>
           <a:p>
             <a:pPr lvl="2"/>
             <a:r>
-              <a:rPr lang="en-US" dirty="0" smtClean="0"/>
+              <a:rPr lang="en-US" dirty="0"/>
               <a:t>Responsibility </a:t>
             </a:r>
           </a:p>
           <a:p>
             <a:pPr lvl="2"/>
             <a:r>
-              <a:rPr lang="en-US" dirty="0" smtClean="0"/>
+              <a:rPr lang="en-US" dirty="0"/>
               <a:t>Caveats</a:t>
             </a:r>
           </a:p>
           <a:p>
             <a:pPr lvl="1"/>
             <a:r>
-              <a:rPr lang="en-US" dirty="0" smtClean="0"/>
+              <a:rPr lang="en-US" dirty="0"/>
               <a:t>Fragment</a:t>
             </a:r>
           </a:p>
           <a:p>
             <a:pPr lvl="2"/>
             <a:r>
-              <a:rPr lang="en-US" dirty="0" smtClean="0"/>
+              <a:rPr lang="en-US" dirty="0"/>
               <a:t>Responsibility </a:t>
             </a:r>
           </a:p>
           <a:p>
             <a:pPr lvl="2"/>
             <a:r>
-              <a:rPr lang="en-US" dirty="0" smtClean="0"/>
+              <a:rPr lang="en-US" dirty="0"/>
               <a:t>Caveats</a:t>
             </a:r>
           </a:p>
           <a:p>
             <a:pPr lvl="2"/>
-            <a:endParaRPr lang="en-US" dirty="0" smtClean="0"/>
+            <a:endParaRPr lang="en-US" dirty="0"/>
           </a:p>
           <a:p>
             <a:pPr lvl="2"/>
-            <a:endParaRPr lang="en-US" dirty="0" smtClean="0"/>
+            <a:endParaRPr lang="en-US" dirty="0"/>
           </a:p>
         </p:txBody>
       </p:sp>
@@ -6687,13 +6536,6 @@
   <p:clrMapOvr>
     <a:masterClrMapping/>
   </p:clrMapOvr>
-  <p:timing>
-    <p:tnLst>
-      <p:par>
-        <p:cTn id="1" dur="indefinite" restart="never" nodeType="tmRoot"/>
-      </p:par>
-    </p:tnLst>
-  </p:timing>
 </p:sld>
 </file>
 
@@ -6730,18 +6572,17 @@
           <a:lstStyle/>
           <a:p>
             <a:r>
-              <a:rPr lang="en-US" dirty="0" smtClean="0"/>
+              <a:rPr lang="en-US" dirty="0"/>
               <a:t>Agenda (</a:t>
             </a:r>
             <a:r>
-              <a:rPr lang="en-US" dirty="0" err="1" smtClean="0"/>
+              <a:rPr lang="en-US" dirty="0" err="1"/>
               <a:t>cont</a:t>
             </a:r>
             <a:r>
-              <a:rPr lang="en-US" dirty="0" smtClean="0"/>
+              <a:rPr lang="en-US" dirty="0"/>
               <a:t>)</a:t>
             </a:r>
-            <a:endParaRPr lang="en-US" dirty="0"/>
           </a:p>
         </p:txBody>
       </p:sp>
@@ -6777,17 +6618,16 @@
           <a:p>
             <a:pPr lvl="2"/>
             <a:r>
-              <a:rPr lang="en-US" dirty="0" smtClean="0"/>
+              <a:rPr lang="en-US" dirty="0"/>
               <a:t>Lifecycle</a:t>
             </a:r>
           </a:p>
           <a:p>
             <a:pPr lvl="2"/>
             <a:r>
-              <a:rPr lang="en-US" dirty="0" smtClean="0"/>
+              <a:rPr lang="en-US" dirty="0"/>
               <a:t>Coding Activity</a:t>
             </a:r>
-            <a:endParaRPr lang="en-US" dirty="0"/>
           </a:p>
           <a:p>
             <a:pPr lvl="2"/>
@@ -6799,22 +6639,16 @@
           <a:p>
             <a:pPr lvl="2"/>
             <a:r>
-              <a:rPr lang="en-US" dirty="0" smtClean="0"/>
+              <a:rPr lang="en-US" dirty="0"/>
               <a:t>Manifest.xml</a:t>
             </a:r>
-            <a:endParaRPr lang="en-US" dirty="0"/>
           </a:p>
           <a:p>
             <a:pPr lvl="2"/>
             <a:r>
-              <a:rPr lang="en-US" dirty="0" smtClean="0"/>
-              <a:t>Activity </a:t>
-            </a:r>
-            <a:r>
-              <a:rPr lang="en-US" dirty="0" smtClean="0"/>
-              <a:t>to Activity communication</a:t>
-            </a:r>
-            <a:endParaRPr lang="en-US" dirty="0"/>
+              <a:rPr lang="en-US" dirty="0"/>
+              <a:t>Activity to Activity communication</a:t>
+            </a:r>
           </a:p>
           <a:p>
             <a:pPr marL="0" indent="0">
@@ -6834,13 +6668,6 @@
   <p:clrMapOvr>
     <a:masterClrMapping/>
   </p:clrMapOvr>
-  <p:timing>
-    <p:tnLst>
-      <p:par>
-        <p:cTn id="1" dur="indefinite" restart="never" nodeType="tmRoot"/>
-      </p:par>
-    </p:tnLst>
-  </p:timing>
 </p:sld>
 </file>
 
@@ -6969,13 +6796,6 @@
   <p:clrMapOvr>
     <a:masterClrMapping/>
   </p:clrMapOvr>
-  <p:timing>
-    <p:tnLst>
-      <p:par>
-        <p:cTn id="1" dur="indefinite" restart="never" nodeType="tmRoot"/>
-      </p:par>
-    </p:tnLst>
-  </p:timing>
 </p:sld>
 </file>
 
@@ -7033,7 +6853,7 @@
             <a:pPr marL="0" indent="0" algn="ctr">
               <a:buNone/>
             </a:pPr>
-            <a:endParaRPr lang="en-US" dirty="0" smtClean="0"/>
+            <a:endParaRPr lang="en-US" dirty="0"/>
           </a:p>
           <a:p>
             <a:pPr marL="0" indent="0" algn="ctr">
@@ -7046,7 +6866,7 @@
               <a:buNone/>
             </a:pPr>
             <a:r>
-              <a:rPr lang="en-US" sz="6600" dirty="0" smtClean="0"/>
+              <a:rPr lang="en-US" sz="6600" dirty="0"/>
               <a:t>High Level </a:t>
             </a:r>
           </a:p>
@@ -7068,13 +6888,6 @@
   <p:clrMapOvr>
     <a:masterClrMapping/>
   </p:clrMapOvr>
-  <p:timing>
-    <p:tnLst>
-      <p:par>
-        <p:cTn id="1" dur="indefinite" restart="never" nodeType="tmRoot"/>
-      </p:par>
-    </p:tnLst>
-  </p:timing>
 </p:sld>
 </file>
 
@@ -7138,42 +6951,24 @@
               <a:rPr lang="en-US" dirty="0"/>
               <a:t>De facto standard for Android development </a:t>
             </a:r>
-            <a:endParaRPr lang="en-US" dirty="0" smtClean="0"/>
-          </a:p>
-          <a:p>
-            <a:r>
-              <a:rPr lang="en-US" dirty="0" smtClean="0"/>
-              <a:t>Built </a:t>
-            </a:r>
-            <a:r>
-              <a:rPr lang="en-US" dirty="0"/>
-              <a:t>on the </a:t>
-            </a:r>
-            <a:r>
-              <a:rPr lang="en-US" dirty="0" smtClean="0"/>
-              <a:t>IntelliJ</a:t>
-            </a:r>
-            <a:endParaRPr lang="en-US" dirty="0"/>
-          </a:p>
-          <a:p>
-            <a:r>
-              <a:rPr lang="en-US" dirty="0" smtClean="0"/>
-              <a:t>Some </a:t>
-            </a:r>
-            <a:r>
-              <a:rPr lang="en-US" dirty="0"/>
-              <a:t>features</a:t>
+          </a:p>
+          <a:p>
+            <a:r>
+              <a:rPr lang="en-US" dirty="0"/>
+              <a:t>Built on the IntelliJ</a:t>
+            </a:r>
+          </a:p>
+          <a:p>
+            <a:r>
+              <a:rPr lang="en-US" dirty="0"/>
+              <a:t>Some features</a:t>
             </a:r>
           </a:p>
           <a:p>
             <a:pPr lvl="1"/>
             <a:r>
-              <a:rPr lang="en-US" dirty="0" smtClean="0"/>
-              <a:t>Layout </a:t>
-            </a:r>
-            <a:r>
-              <a:rPr lang="en-US" dirty="0"/>
-              <a:t>Editor</a:t>
+              <a:rPr lang="en-US" dirty="0"/>
+              <a:t>Layout Editor</a:t>
             </a:r>
           </a:p>
           <a:p>
@@ -7191,22 +6986,14 @@
             </a:r>
             <a:r>
               <a:rPr lang="en-US" dirty="0"/>
-              <a:t> </a:t>
-            </a:r>
-            <a:r>
-              <a:rPr lang="en-US" dirty="0" smtClean="0"/>
-              <a:t>integration</a:t>
+              <a:t> integration</a:t>
             </a:r>
           </a:p>
           <a:p>
             <a:pPr lvl="1"/>
             <a:r>
-              <a:rPr lang="en-US" dirty="0" smtClean="0"/>
-              <a:t>Instant </a:t>
-            </a:r>
-            <a:r>
-              <a:rPr lang="en-US" dirty="0"/>
-              <a:t>Run (Hot swap)</a:t>
+              <a:rPr lang="en-US" dirty="0"/>
+              <a:t>Instant Run (Hot swap)</a:t>
             </a:r>
           </a:p>
           <a:p>
@@ -7276,13 +7063,6 @@
   <p:clrMapOvr>
     <a:masterClrMapping/>
   </p:clrMapOvr>
-  <p:timing>
-    <p:tnLst>
-      <p:par>
-        <p:cTn id="1" dur="indefinite" restart="never" nodeType="tmRoot"/>
-      </p:par>
-    </p:tnLst>
-  </p:timing>
 </p:sld>
 </file>
 
@@ -7319,10 +7099,9 @@
           <a:lstStyle/>
           <a:p>
             <a:r>
-              <a:rPr lang="en-US" dirty="0" smtClean="0"/>
+              <a:rPr lang="en-US" dirty="0"/>
               <a:t>Definition Overview</a:t>
             </a:r>
-            <a:endParaRPr lang="en-US" dirty="0"/>
           </a:p>
         </p:txBody>
       </p:sp>
@@ -7342,25 +7121,25 @@
           <a:lstStyle/>
           <a:p>
             <a:r>
-              <a:rPr lang="en-US" dirty="0" smtClean="0"/>
+              <a:rPr lang="en-US" dirty="0"/>
               <a:t>Activity </a:t>
             </a:r>
           </a:p>
           <a:p>
             <a:r>
-              <a:rPr lang="en-US" dirty="0" smtClean="0"/>
+              <a:rPr lang="en-US" dirty="0"/>
               <a:t>Fragments </a:t>
             </a:r>
           </a:p>
           <a:p>
             <a:r>
-              <a:rPr lang="en-US" dirty="0" smtClean="0"/>
+              <a:rPr lang="en-US" dirty="0"/>
               <a:t>Views </a:t>
             </a:r>
           </a:p>
           <a:p>
             <a:r>
-              <a:rPr lang="en-US" dirty="0" smtClean="0"/>
+              <a:rPr lang="en-US" dirty="0"/>
               <a:t>Manifest</a:t>
             </a:r>
           </a:p>
@@ -7382,13 +7161,6 @@
   <p:clrMapOvr>
     <a:masterClrMapping/>
   </p:clrMapOvr>
-  <p:timing>
-    <p:tnLst>
-      <p:par>
-        <p:cTn id="1" dur="indefinite" restart="never" nodeType="tmRoot"/>
-      </p:par>
-    </p:tnLst>
-  </p:timing>
 </p:sld>
 </file>
 
@@ -7430,15 +7202,11 @@
           <a:lstStyle/>
           <a:p>
             <a:r>
-              <a:rPr lang="en-US" b="1" dirty="0" smtClean="0"/>
+              <a:rPr lang="en-US" b="1" dirty="0"/>
               <a:t>Activity</a:t>
             </a:r>
-            <a:r>
-              <a:rPr lang="en-US" dirty="0" smtClean="0"/>
-              <a:t/>
-            </a:r>
             <a:br>
-              <a:rPr lang="en-US" dirty="0" smtClean="0"/>
+              <a:rPr lang="en-US" dirty="0"/>
             </a:br>
             <a:r>
               <a:rPr lang="en-US" sz="2000" dirty="0">
@@ -7473,60 +7241,33 @@
           <a:lstStyle/>
           <a:p>
             <a:r>
-              <a:rPr lang="en-US" dirty="0" smtClean="0"/>
-              <a:t>Fundamental </a:t>
-            </a:r>
-            <a:r>
-              <a:rPr lang="en-US" dirty="0"/>
-              <a:t>building blocks </a:t>
-            </a:r>
-            <a:endParaRPr lang="en-US" dirty="0" smtClean="0"/>
-          </a:p>
-          <a:p>
-            <a:r>
-              <a:rPr lang="en-US" dirty="0" smtClean="0"/>
-              <a:t>Entry </a:t>
-            </a:r>
-            <a:r>
-              <a:rPr lang="en-US" dirty="0"/>
-              <a:t>point for </a:t>
-            </a:r>
-            <a:r>
-              <a:rPr lang="en-US" dirty="0" smtClean="0"/>
-              <a:t>user's </a:t>
-            </a:r>
-            <a:r>
-              <a:rPr lang="en-US" dirty="0"/>
-              <a:t>interaction </a:t>
-            </a:r>
-            <a:endParaRPr lang="en-US" dirty="0" smtClean="0"/>
-          </a:p>
-          <a:p>
-            <a:r>
-              <a:rPr lang="en-US" dirty="0" smtClean="0"/>
-              <a:t>Provides navigates </a:t>
-            </a:r>
-            <a:r>
-              <a:rPr lang="en-US" dirty="0"/>
-              <a:t>within an </a:t>
-            </a:r>
-            <a:r>
-              <a:rPr lang="en-US" dirty="0" smtClean="0"/>
-              <a:t>app</a:t>
-            </a:r>
-          </a:p>
-          <a:p>
-            <a:r>
-              <a:rPr lang="en-US" dirty="0" smtClean="0"/>
+              <a:rPr lang="en-US" dirty="0"/>
+              <a:t>Fundamental building blocks </a:t>
+            </a:r>
+          </a:p>
+          <a:p>
+            <a:r>
+              <a:rPr lang="en-US" dirty="0"/>
+              <a:t>Entry point for user's interaction </a:t>
+            </a:r>
+          </a:p>
+          <a:p>
+            <a:r>
+              <a:rPr lang="en-US" dirty="0"/>
+              <a:t>Provides navigates within an app</a:t>
+            </a:r>
+          </a:p>
+          <a:p>
+            <a:r>
+              <a:rPr lang="en-US" dirty="0"/>
               <a:t>Communication between other activities</a:t>
             </a:r>
           </a:p>
           <a:p>
             <a:r>
-              <a:rPr lang="en-US" dirty="0" smtClean="0"/>
+              <a:rPr lang="en-US" dirty="0"/>
               <a:t>Communication between child fragments</a:t>
             </a:r>
-            <a:endParaRPr lang="en-US" dirty="0"/>
           </a:p>
         </p:txBody>
       </p:sp>
@@ -7568,7 +7309,7 @@
             <a:p>
               <a:pPr algn="ctr"/>
               <a:r>
-                <a:rPr lang="en-US" sz="3600" dirty="0" smtClean="0">
+                <a:rPr lang="en-US" sz="3600" dirty="0">
                   <a:solidFill>
                     <a:srgbClr val="FF0000"/>
                   </a:solidFill>

</xml_diff>

<commit_message>
updated toast and slides
</commit_message>
<xml_diff>
--- a/slides/Android Studio_Activities_Fragments.pptx
+++ b/slides/Android Studio_Activities_Fragments.pptx
@@ -66,10 +66,6 @@
     <p:sldId id="322" r:id="rId60"/>
     <p:sldId id="312" r:id="rId61"/>
     <p:sldId id="324" r:id="rId62"/>
-    <p:sldId id="325" r:id="rId63"/>
-    <p:sldId id="329" r:id="rId64"/>
-    <p:sldId id="330" r:id="rId65"/>
-    <p:sldId id="331" r:id="rId66"/>
   </p:sldIdLst>
   <p:sldSz cx="12192000" cy="6858000"/>
   <p:notesSz cx="6858000" cy="9144000"/>
@@ -170,7 +166,7 @@
   </p:defaultTextStyle>
   <p:extLst>
     <p:ext uri="{EFAFB233-063F-42B5-8137-9DF3F51BA10A}">
-      <p15:sldGuideLst xmlns:p15="http://schemas.microsoft.com/office/powerpoint/2012/main">
+      <p15:sldGuideLst xmlns:p15="http://schemas.microsoft.com/office/powerpoint/2012/main" xmlns="">
         <p15:guide id="1" orient="horz" pos="2160">
           <p15:clr>
             <a:srgbClr val="A4A3A4"/>
@@ -3927,6 +3923,10 @@
               <a:rPr lang="en-US" b="1" dirty="0"/>
               <a:t>Activity</a:t>
             </a:r>
+            <a:r>
+              <a:rPr lang="en-US" dirty="0"/>
+              <a:t/>
+            </a:r>
             <a:br>
               <a:rPr lang="en-US" dirty="0"/>
             </a:br>
@@ -4583,7 +4583,7 @@
           <p:cNvPr id="2" name="Title 1">
             <a:extLst>
               <a:ext uri="{FF2B5EF4-FFF2-40B4-BE49-F238E27FC236}">
-                <a16:creationId xmlns:a16="http://schemas.microsoft.com/office/drawing/2014/main" id="{8955F4A5-9664-41BD-8FCE-D77B9F0D51F8}"/>
+                <a16:creationId xmlns:a16="http://schemas.microsoft.com/office/drawing/2014/main" xmlns="" id="{8955F4A5-9664-41BD-8FCE-D77B9F0D51F8}"/>
               </a:ext>
             </a:extLst>
           </p:cNvPr>
@@ -4619,7 +4619,7 @@
           <p:cNvPr id="3" name="Content Placeholder 2">
             <a:extLst>
               <a:ext uri="{FF2B5EF4-FFF2-40B4-BE49-F238E27FC236}">
-                <a16:creationId xmlns:a16="http://schemas.microsoft.com/office/drawing/2014/main" id="{648D5158-09EF-4590-93E1-68E59B31A864}"/>
+                <a16:creationId xmlns:a16="http://schemas.microsoft.com/office/drawing/2014/main" xmlns="" id="{648D5158-09EF-4590-93E1-68E59B31A864}"/>
               </a:ext>
             </a:extLst>
           </p:cNvPr>
@@ -5008,7 +5008,7 @@
           <p:cNvPr id="2" name="Title 1">
             <a:extLst>
               <a:ext uri="{FF2B5EF4-FFF2-40B4-BE49-F238E27FC236}">
-                <a16:creationId xmlns:a16="http://schemas.microsoft.com/office/drawing/2014/main" id="{40E28D8C-70E2-453E-86D6-07C0E276675E}"/>
+                <a16:creationId xmlns:a16="http://schemas.microsoft.com/office/drawing/2014/main" xmlns="" id="{40E28D8C-70E2-453E-86D6-07C0E276675E}"/>
               </a:ext>
             </a:extLst>
           </p:cNvPr>
@@ -5044,7 +5044,7 @@
           <p:cNvPr id="3" name="Content Placeholder 2">
             <a:extLst>
               <a:ext uri="{FF2B5EF4-FFF2-40B4-BE49-F238E27FC236}">
-                <a16:creationId xmlns:a16="http://schemas.microsoft.com/office/drawing/2014/main" id="{4EEFC9F3-9443-4188-B583-79F8E3F8DBE5}"/>
+                <a16:creationId xmlns:a16="http://schemas.microsoft.com/office/drawing/2014/main" xmlns="" id="{4EEFC9F3-9443-4188-B583-79F8E3F8DBE5}"/>
               </a:ext>
             </a:extLst>
           </p:cNvPr>
@@ -5572,7 +5572,7 @@
           <p:cNvPr id="2" name="Title 1">
             <a:extLst>
               <a:ext uri="{FF2B5EF4-FFF2-40B4-BE49-F238E27FC236}">
-                <a16:creationId xmlns:a16="http://schemas.microsoft.com/office/drawing/2014/main" id="{9C92EB54-61C5-4F88-9B57-EA1ACC2F56E6}"/>
+                <a16:creationId xmlns:a16="http://schemas.microsoft.com/office/drawing/2014/main" xmlns="" id="{9C92EB54-61C5-4F88-9B57-EA1ACC2F56E6}"/>
               </a:ext>
             </a:extLst>
           </p:cNvPr>
@@ -5608,7 +5608,7 @@
           <p:cNvPr id="3" name="Content Placeholder 2">
             <a:extLst>
               <a:ext uri="{FF2B5EF4-FFF2-40B4-BE49-F238E27FC236}">
-                <a16:creationId xmlns:a16="http://schemas.microsoft.com/office/drawing/2014/main" id="{CB6D488D-1FC6-41B9-BEB2-042DB25F493A}"/>
+                <a16:creationId xmlns:a16="http://schemas.microsoft.com/office/drawing/2014/main" xmlns="" id="{CB6D488D-1FC6-41B9-BEB2-042DB25F493A}"/>
               </a:ext>
             </a:extLst>
           </p:cNvPr>
@@ -6964,7 +6964,7 @@
           <p:cNvPr id="2" name="Title 1">
             <a:extLst>
               <a:ext uri="{FF2B5EF4-FFF2-40B4-BE49-F238E27FC236}">
-                <a16:creationId xmlns:a16="http://schemas.microsoft.com/office/drawing/2014/main" id="{082D42FD-F515-4A38-AEC3-4676608EFF5E}"/>
+                <a16:creationId xmlns:a16="http://schemas.microsoft.com/office/drawing/2014/main" xmlns="" id="{082D42FD-F515-4A38-AEC3-4676608EFF5E}"/>
               </a:ext>
             </a:extLst>
           </p:cNvPr>
@@ -8687,6 +8687,13 @@
   <p:clrMapOvr>
     <a:masterClrMapping/>
   </p:clrMapOvr>
+  <p:timing>
+    <p:tnLst>
+      <p:par>
+        <p:cTn id="1" dur="indefinite" restart="never" nodeType="tmRoot"/>
+      </p:par>
+    </p:tnLst>
+  </p:timing>
 </p:sld>
 </file>
 
@@ -8712,7 +8719,7 @@
           <p:cNvPr id="2" name="Title 1">
             <a:extLst>
               <a:ext uri="{FF2B5EF4-FFF2-40B4-BE49-F238E27FC236}">
-                <a16:creationId xmlns:a16="http://schemas.microsoft.com/office/drawing/2014/main" id="{0EB85E40-6436-4544-A371-9E25D85E851A}"/>
+                <a16:creationId xmlns:a16="http://schemas.microsoft.com/office/drawing/2014/main" xmlns="" id="{0EB85E40-6436-4544-A371-9E25D85E851A}"/>
               </a:ext>
             </a:extLst>
           </p:cNvPr>
@@ -8740,7 +8747,7 @@
           <p:cNvPr id="4" name="Rectangle 1">
             <a:extLst>
               <a:ext uri="{FF2B5EF4-FFF2-40B4-BE49-F238E27FC236}">
-                <a16:creationId xmlns:a16="http://schemas.microsoft.com/office/drawing/2014/main" id="{6347CDD4-E303-43F0-AB40-C6563C4F12E9}"/>
+                <a16:creationId xmlns:a16="http://schemas.microsoft.com/office/drawing/2014/main" xmlns="" id="{6347CDD4-E303-43F0-AB40-C6563C4F12E9}"/>
               </a:ext>
             </a:extLst>
           </p:cNvPr>
@@ -9253,6 +9260,20 @@
                 <a:cs typeface="Courier New" panose="02070309020205020404" pitchFamily="49" charset="0"/>
               </a:rPr>
             </a:br>
+            <a:r>
+              <a:rPr kumimoji="0" lang="en-US" altLang="en-US" sz="900" b="0" i="0" u="none" strike="noStrike" cap="none" normalizeH="0" baseline="0">
+                <a:ln>
+                  <a:noFill/>
+                </a:ln>
+                <a:solidFill>
+                  <a:srgbClr val="E8BF6A"/>
+                </a:solidFill>
+                <a:effectLst/>
+                <a:latin typeface="Courier New" panose="02070309020205020404" pitchFamily="49" charset="0"/>
+                <a:cs typeface="Courier New" panose="02070309020205020404" pitchFamily="49" charset="0"/>
+              </a:rPr>
+              <a:t/>
+            </a:r>
             <a:br>
               <a:rPr kumimoji="0" lang="en-US" altLang="en-US" sz="900" b="0" i="0" u="none" strike="noStrike" cap="none" normalizeH="0" baseline="0">
                 <a:ln>
@@ -9966,6 +9987,47 @@
           </a:p>
         </p:txBody>
       </p:sp>
+      <p:pic>
+        <p:nvPicPr>
+          <p:cNvPr id="1026" name="Picture 2" descr="C:\Users\brian.batchelor\AppData\Local\Microsoft\Windows\INetCache\IE\GT1NZ5PW\600px-No_sign.svg[1].png"/>
+          <p:cNvPicPr>
+            <a:picLocks noChangeAspect="1" noChangeArrowheads="1"/>
+          </p:cNvPicPr>
+          <p:nvPr/>
+        </p:nvPicPr>
+        <p:blipFill>
+          <a:blip r:embed="rId2">
+            <a:extLst>
+              <a:ext uri="{28A0092B-C50C-407E-A947-70E740481C1C}">
+                <a14:useLocalDpi xmlns:a14="http://schemas.microsoft.com/office/drawing/2010/main" val="0"/>
+              </a:ext>
+            </a:extLst>
+          </a:blip>
+          <a:srcRect/>
+          <a:stretch>
+            <a:fillRect/>
+          </a:stretch>
+        </p:blipFill>
+        <p:spPr bwMode="auto">
+          <a:xfrm>
+            <a:off x="3581400" y="1036320"/>
+            <a:ext cx="4907280" cy="4907280"/>
+          </a:xfrm>
+          <a:prstGeom prst="rect">
+            <a:avLst/>
+          </a:prstGeom>
+          <a:noFill/>
+          <a:extLst>
+            <a:ext uri="{909E8E84-426E-40DD-AFC4-6F175D3DCCD1}">
+              <a14:hiddenFill xmlns:a14="http://schemas.microsoft.com/office/drawing/2010/main">
+                <a:solidFill>
+                  <a:srgbClr val="FFFFFF"/>
+                </a:solidFill>
+              </a14:hiddenFill>
+            </a:ext>
+          </a:extLst>
+        </p:spPr>
+      </p:pic>
     </p:spTree>
     <p:extLst>
       <p:ext uri="{BB962C8B-B14F-4D97-AF65-F5344CB8AC3E}">
@@ -9976,6 +10038,135 @@
   <p:clrMapOvr>
     <a:masterClrMapping/>
   </p:clrMapOvr>
+  <p:timing>
+    <p:tnLst>
+      <p:par>
+        <p:cTn id="1" dur="indefinite" restart="never" nodeType="tmRoot">
+          <p:childTnLst>
+            <p:seq concurrent="1" nextAc="seek">
+              <p:cTn id="2" dur="indefinite" nodeType="mainSeq">
+                <p:childTnLst>
+                  <p:par>
+                    <p:cTn id="3" fill="hold">
+                      <p:stCondLst>
+                        <p:cond delay="indefinite"/>
+                      </p:stCondLst>
+                      <p:childTnLst>
+                        <p:par>
+                          <p:cTn id="4" fill="hold">
+                            <p:stCondLst>
+                              <p:cond delay="0"/>
+                            </p:stCondLst>
+                            <p:childTnLst>
+                              <p:par>
+                                <p:cTn id="5" presetID="53" presetClass="entr" presetSubtype="16" fill="hold" nodeType="clickEffect">
+                                  <p:stCondLst>
+                                    <p:cond delay="0"/>
+                                  </p:stCondLst>
+                                  <p:childTnLst>
+                                    <p:set>
+                                      <p:cBhvr>
+                                        <p:cTn id="6" dur="1" fill="hold">
+                                          <p:stCondLst>
+                                            <p:cond delay="0"/>
+                                          </p:stCondLst>
+                                        </p:cTn>
+                                        <p:tgtEl>
+                                          <p:spTgt spid="1026"/>
+                                        </p:tgtEl>
+                                        <p:attrNameLst>
+                                          <p:attrName>style.visibility</p:attrName>
+                                        </p:attrNameLst>
+                                      </p:cBhvr>
+                                      <p:to>
+                                        <p:strVal val="visible"/>
+                                      </p:to>
+                                    </p:set>
+                                    <p:anim calcmode="lin" valueType="num">
+                                      <p:cBhvr>
+                                        <p:cTn id="7" dur="500" fill="hold"/>
+                                        <p:tgtEl>
+                                          <p:spTgt spid="1026"/>
+                                        </p:tgtEl>
+                                        <p:attrNameLst>
+                                          <p:attrName>ppt_w</p:attrName>
+                                        </p:attrNameLst>
+                                      </p:cBhvr>
+                                      <p:tavLst>
+                                        <p:tav tm="0">
+                                          <p:val>
+                                            <p:fltVal val="0"/>
+                                          </p:val>
+                                        </p:tav>
+                                        <p:tav tm="100000">
+                                          <p:val>
+                                            <p:strVal val="#ppt_w"/>
+                                          </p:val>
+                                        </p:tav>
+                                      </p:tavLst>
+                                    </p:anim>
+                                    <p:anim calcmode="lin" valueType="num">
+                                      <p:cBhvr>
+                                        <p:cTn id="8" dur="500" fill="hold"/>
+                                        <p:tgtEl>
+                                          <p:spTgt spid="1026"/>
+                                        </p:tgtEl>
+                                        <p:attrNameLst>
+                                          <p:attrName>ppt_h</p:attrName>
+                                        </p:attrNameLst>
+                                      </p:cBhvr>
+                                      <p:tavLst>
+                                        <p:tav tm="0">
+                                          <p:val>
+                                            <p:fltVal val="0"/>
+                                          </p:val>
+                                        </p:tav>
+                                        <p:tav tm="100000">
+                                          <p:val>
+                                            <p:strVal val="#ppt_h"/>
+                                          </p:val>
+                                        </p:tav>
+                                      </p:tavLst>
+                                    </p:anim>
+                                    <p:animEffect transition="in" filter="fade">
+                                      <p:cBhvr>
+                                        <p:cTn id="9" dur="500"/>
+                                        <p:tgtEl>
+                                          <p:spTgt spid="1026"/>
+                                        </p:tgtEl>
+                                      </p:cBhvr>
+                                    </p:animEffect>
+                                  </p:childTnLst>
+                                </p:cTn>
+                              </p:par>
+                            </p:childTnLst>
+                          </p:cTn>
+                        </p:par>
+                      </p:childTnLst>
+                    </p:cTn>
+                  </p:par>
+                </p:childTnLst>
+              </p:cTn>
+              <p:prevCondLst>
+                <p:cond evt="onPrev" delay="0">
+                  <p:tgtEl>
+                    <p:sldTgt/>
+                  </p:tgtEl>
+                </p:cond>
+              </p:prevCondLst>
+              <p:nextCondLst>
+                <p:cond evt="onNext" delay="0">
+                  <p:tgtEl>
+                    <p:sldTgt/>
+                  </p:tgtEl>
+                </p:cond>
+              </p:nextCondLst>
+            </p:seq>
+          </p:childTnLst>
+        </p:cTn>
+      </p:par>
+    </p:tnLst>
+  </p:timing>
 </p:sld>
 </file>
 
@@ -10040,6 +10231,13 @@
   <p:clrMapOvr>
     <a:masterClrMapping/>
   </p:clrMapOvr>
+  <p:timing>
+    <p:tnLst>
+      <p:par>
+        <p:cTn id="1" dur="indefinite" restart="never" nodeType="tmRoot"/>
+      </p:par>
+    </p:tnLst>
+  </p:timing>
 </p:sld>
 </file>
 
@@ -10137,6 +10335,13 @@
   <p:clrMapOvr>
     <a:masterClrMapping/>
   </p:clrMapOvr>
+  <p:timing>
+    <p:tnLst>
+      <p:par>
+        <p:cTn id="1" dur="indefinite" restart="never" nodeType="tmRoot"/>
+      </p:par>
+    </p:tnLst>
+  </p:timing>
 </p:sld>
 </file>
 
@@ -10212,6 +10417,13 @@
   <p:clrMapOvr>
     <a:masterClrMapping/>
   </p:clrMapOvr>
+  <p:timing>
+    <p:tnLst>
+      <p:par>
+        <p:cTn id="1" dur="indefinite" restart="never" nodeType="tmRoot"/>
+      </p:par>
+    </p:tnLst>
+  </p:timing>
 </p:sld>
 </file>
 
@@ -10279,6 +10491,13 @@
   <p:clrMapOvr>
     <a:masterClrMapping/>
   </p:clrMapOvr>
+  <p:timing>
+    <p:tnLst>
+      <p:par>
+        <p:cTn id="1" dur="indefinite" restart="never" nodeType="tmRoot"/>
+      </p:par>
+    </p:tnLst>
+  </p:timing>
 </p:sld>
 </file>
 
@@ -10392,6 +10611,13 @@
   <p:clrMapOvr>
     <a:masterClrMapping/>
   </p:clrMapOvr>
+  <p:timing>
+    <p:tnLst>
+      <p:par>
+        <p:cTn id="1" dur="indefinite" restart="never" nodeType="tmRoot"/>
+      </p:par>
+    </p:tnLst>
+  </p:timing>
 </p:sld>
 </file>
 
@@ -11098,6 +11324,13 @@
   <p:clrMapOvr>
     <a:masterClrMapping/>
   </p:clrMapOvr>
+  <p:timing>
+    <p:tnLst>
+      <p:par>
+        <p:cTn id="1" dur="indefinite" restart="never" nodeType="tmRoot"/>
+      </p:par>
+    </p:tnLst>
+  </p:timing>
 </p:sld>
 </file>
 
@@ -11534,6 +11767,13 @@
   <p:clrMapOvr>
     <a:masterClrMapping/>
   </p:clrMapOvr>
+  <p:timing>
+    <p:tnLst>
+      <p:par>
+        <p:cTn id="1" dur="indefinite" restart="never" nodeType="tmRoot"/>
+      </p:par>
+    </p:tnLst>
+  </p:timing>
 </p:sld>
 </file>
 
@@ -11638,6 +11878,13 @@
   <p:clrMapOvr>
     <a:masterClrMapping/>
   </p:clrMapOvr>
+  <p:timing>
+    <p:tnLst>
+      <p:par>
+        <p:cTn id="1" dur="indefinite" restart="never" nodeType="tmRoot"/>
+      </p:par>
+    </p:tnLst>
+  </p:timing>
 </p:sld>
 </file>
 
@@ -12068,6 +12315,13 @@
   <p:clrMapOvr>
     <a:masterClrMapping/>
   </p:clrMapOvr>
+  <p:timing>
+    <p:tnLst>
+      <p:par>
+        <p:cTn id="1" dur="indefinite" restart="never" nodeType="tmRoot"/>
+      </p:par>
+    </p:tnLst>
+  </p:timing>
 </p:sld>
 </file>
 
@@ -12153,6 +12407,13 @@
   <p:clrMapOvr>
     <a:masterClrMapping/>
   </p:clrMapOvr>
+  <p:timing>
+    <p:tnLst>
+      <p:par>
+        <p:cTn id="1" dur="indefinite" restart="never" nodeType="tmRoot"/>
+      </p:par>
+    </p:tnLst>
+  </p:timing>
 </p:sld>
 </file>
 
@@ -12589,6 +12850,13 @@
   <p:clrMapOvr>
     <a:masterClrMapping/>
   </p:clrMapOvr>
+  <p:timing>
+    <p:tnLst>
+      <p:par>
+        <p:cTn id="1" dur="indefinite" restart="never" nodeType="tmRoot"/>
+      </p:par>
+    </p:tnLst>
+  </p:timing>
 </p:sld>
 </file>
 
@@ -12679,6 +12947,13 @@
   <p:clrMapOvr>
     <a:masterClrMapping/>
   </p:clrMapOvr>
+  <p:timing>
+    <p:tnLst>
+      <p:par>
+        <p:cTn id="1" dur="indefinite" restart="never" nodeType="tmRoot"/>
+      </p:par>
+    </p:tnLst>
+  </p:timing>
 </p:sld>
 </file>
 
@@ -13115,6 +13390,13 @@
   <p:clrMapOvr>
     <a:masterClrMapping/>
   </p:clrMapOvr>
+  <p:timing>
+    <p:tnLst>
+      <p:par>
+        <p:cTn id="1" dur="indefinite" restart="never" nodeType="tmRoot"/>
+      </p:par>
+    </p:tnLst>
+  </p:timing>
 </p:sld>
 </file>
 
@@ -13200,6 +13482,13 @@
   <p:clrMapOvr>
     <a:masterClrMapping/>
   </p:clrMapOvr>
+  <p:timing>
+    <p:tnLst>
+      <p:par>
+        <p:cTn id="1" dur="indefinite" restart="never" nodeType="tmRoot"/>
+      </p:par>
+    </p:tnLst>
+  </p:timing>
 </p:sld>
 </file>
 
@@ -13816,6 +14105,13 @@
   <p:clrMapOvr>
     <a:masterClrMapping/>
   </p:clrMapOvr>
+  <p:timing>
+    <p:tnLst>
+      <p:par>
+        <p:cTn id="1" dur="indefinite" restart="never" nodeType="tmRoot"/>
+      </p:par>
+    </p:tnLst>
+  </p:timing>
 </p:sld>
 </file>
 
@@ -14170,6 +14466,13 @@
   <p:clrMapOvr>
     <a:masterClrMapping/>
   </p:clrMapOvr>
+  <p:timing>
+    <p:tnLst>
+      <p:par>
+        <p:cTn id="1" dur="indefinite" restart="never" nodeType="tmRoot"/>
+      </p:par>
+    </p:tnLst>
+  </p:timing>
 </p:sld>
 </file>
 
@@ -14273,6 +14576,13 @@
   <p:clrMapOvr>
     <a:masterClrMapping/>
   </p:clrMapOvr>
+  <p:timing>
+    <p:tnLst>
+      <p:par>
+        <p:cTn id="1" dur="indefinite" restart="never" nodeType="tmRoot"/>
+      </p:par>
+    </p:tnLst>
+  </p:timing>
 </p:sld>
 </file>
 
@@ -14381,7 +14691,7 @@
           <p:cNvPr id="5" name="Picture 4">
             <a:extLst>
               <a:ext uri="{FF2B5EF4-FFF2-40B4-BE49-F238E27FC236}">
-                <a16:creationId xmlns:a16="http://schemas.microsoft.com/office/drawing/2014/main" id="{169F10F5-FFE5-4B46-8CFE-EB24150C2800}"/>
+                <a16:creationId xmlns:a16="http://schemas.microsoft.com/office/drawing/2014/main" xmlns="" id="{169F10F5-FFE5-4B46-8CFE-EB24150C2800}"/>
               </a:ext>
             </a:extLst>
           </p:cNvPr>
@@ -14566,6 +14876,13 @@
   <p:clrMapOvr>
     <a:masterClrMapping/>
   </p:clrMapOvr>
+  <p:timing>
+    <p:tnLst>
+      <p:par>
+        <p:cTn id="1" dur="indefinite" restart="never" nodeType="tmRoot"/>
+      </p:par>
+    </p:tnLst>
+  </p:timing>
 </p:sld>
 </file>
 
@@ -14647,6 +14964,13 @@
   <p:clrMapOvr>
     <a:masterClrMapping/>
   </p:clrMapOvr>
+  <p:timing>
+    <p:tnLst>
+      <p:par>
+        <p:cTn id="1" dur="indefinite" restart="never" nodeType="tmRoot"/>
+      </p:par>
+    </p:tnLst>
+  </p:timing>
 </p:sld>
 </file>
 
@@ -15269,6 +15593,13 @@
   <p:clrMapOvr>
     <a:masterClrMapping/>
   </p:clrMapOvr>
+  <p:timing>
+    <p:tnLst>
+      <p:par>
+        <p:cTn id="1" dur="indefinite" restart="never" nodeType="tmRoot"/>
+      </p:par>
+    </p:tnLst>
+  </p:timing>
 </p:sld>
 </file>
 
@@ -15354,6 +15685,13 @@
   <p:clrMapOvr>
     <a:masterClrMapping/>
   </p:clrMapOvr>
+  <p:timing>
+    <p:tnLst>
+      <p:par>
+        <p:cTn id="1" dur="indefinite" restart="never" nodeType="tmRoot"/>
+      </p:par>
+    </p:tnLst>
+  </p:timing>
 </p:sld>
 </file>
 
@@ -15421,6 +15759,13 @@
   <p:clrMapOvr>
     <a:masterClrMapping/>
   </p:clrMapOvr>
+  <p:timing>
+    <p:tnLst>
+      <p:par>
+        <p:cTn id="1" dur="indefinite" restart="never" nodeType="tmRoot"/>
+      </p:par>
+    </p:tnLst>
+  </p:timing>
 </p:sld>
 </file>
 
@@ -15736,6 +16081,13 @@
   <p:clrMapOvr>
     <a:masterClrMapping/>
   </p:clrMapOvr>
+  <p:timing>
+    <p:tnLst>
+      <p:par>
+        <p:cTn id="1" dur="indefinite" restart="never" nodeType="tmRoot"/>
+      </p:par>
+    </p:tnLst>
+  </p:timing>
 </p:sld>
 </file>
 
@@ -15787,9 +16139,10 @@
               <a:buNone/>
             </a:pPr>
             <a:r>
-              <a:rPr lang="en-US" dirty="0"/>
-              <a:t>Extra</a:t>
-            </a:r>
+              <a:rPr lang="en-US" dirty="0" smtClean="0"/>
+              <a:t>Questions</a:t>
+            </a:r>
+            <a:endParaRPr lang="en-US" dirty="0"/>
           </a:p>
         </p:txBody>
       </p:sp>
@@ -15803,295 +16156,13 @@
   <p:clrMapOvr>
     <a:masterClrMapping/>
   </p:clrMapOvr>
-</p:sld>
-</file>
-
-<file path=ppt/slides/slide62.xml><?xml version="1.0" encoding="utf-8"?>
-<p:sld xmlns:a="http://schemas.openxmlformats.org/drawingml/2006/main" xmlns:r="http://schemas.openxmlformats.org/officeDocument/2006/relationships" xmlns:p="http://schemas.openxmlformats.org/presentationml/2006/main">
-  <p:cSld>
-    <p:spTree>
-      <p:nvGrpSpPr>
-        <p:cNvPr id="1" name=""/>
-        <p:cNvGrpSpPr/>
-        <p:nvPr/>
-      </p:nvGrpSpPr>
-      <p:grpSpPr>
-        <a:xfrm>
-          <a:off x="0" y="0"/>
-          <a:ext cx="0" cy="0"/>
-          <a:chOff x="0" y="0"/>
-          <a:chExt cx="0" cy="0"/>
-        </a:xfrm>
-      </p:grpSpPr>
-      <p:sp>
-        <p:nvSpPr>
-          <p:cNvPr id="2" name="Title 1"/>
-          <p:cNvSpPr>
-            <a:spLocks noGrp="1"/>
-          </p:cNvSpPr>
-          <p:nvPr>
-            <p:ph type="title"/>
-          </p:nvPr>
-        </p:nvSpPr>
-        <p:spPr/>
-        <p:txBody>
-          <a:bodyPr/>
-          <a:lstStyle/>
-          <a:p>
-            <a:r>
-              <a:rPr lang="en-US" dirty="0"/>
-              <a:t>Landscape Layout </a:t>
-            </a:r>
-          </a:p>
-        </p:txBody>
-      </p:sp>
-      <p:sp>
-        <p:nvSpPr>
-          <p:cNvPr id="3" name="Content Placeholder 2"/>
-          <p:cNvSpPr>
-            <a:spLocks noGrp="1"/>
-          </p:cNvSpPr>
-          <p:nvPr>
-            <p:ph idx="1"/>
-          </p:nvPr>
-        </p:nvSpPr>
-        <p:spPr/>
-        <p:txBody>
-          <a:bodyPr/>
-          <a:lstStyle/>
-          <a:p>
-            <a:endParaRPr lang="en-US" dirty="0"/>
-          </a:p>
-        </p:txBody>
-      </p:sp>
-    </p:spTree>
-    <p:extLst>
-      <p:ext uri="{BB962C8B-B14F-4D97-AF65-F5344CB8AC3E}">
-        <p14:creationId xmlns:p14="http://schemas.microsoft.com/office/powerpoint/2010/main" val="449537407"/>
-      </p:ext>
-    </p:extLst>
-  </p:cSld>
-  <p:clrMapOvr>
-    <a:masterClrMapping/>
-  </p:clrMapOvr>
-</p:sld>
-</file>
-
-<file path=ppt/slides/slide63.xml><?xml version="1.0" encoding="utf-8"?>
-<p:sld xmlns:a="http://schemas.openxmlformats.org/drawingml/2006/main" xmlns:r="http://schemas.openxmlformats.org/officeDocument/2006/relationships" xmlns:p="http://schemas.openxmlformats.org/presentationml/2006/main">
-  <p:cSld>
-    <p:spTree>
-      <p:nvGrpSpPr>
-        <p:cNvPr id="1" name=""/>
-        <p:cNvGrpSpPr/>
-        <p:nvPr/>
-      </p:nvGrpSpPr>
-      <p:grpSpPr>
-        <a:xfrm>
-          <a:off x="0" y="0"/>
-          <a:ext cx="0" cy="0"/>
-          <a:chOff x="0" y="0"/>
-          <a:chExt cx="0" cy="0"/>
-        </a:xfrm>
-      </p:grpSpPr>
-      <p:sp>
-        <p:nvSpPr>
-          <p:cNvPr id="2" name="Title 1"/>
-          <p:cNvSpPr>
-            <a:spLocks noGrp="1"/>
-          </p:cNvSpPr>
-          <p:nvPr>
-            <p:ph type="title"/>
-          </p:nvPr>
-        </p:nvSpPr>
-        <p:spPr/>
-        <p:txBody>
-          <a:bodyPr/>
-          <a:lstStyle/>
-          <a:p>
-            <a:r>
-              <a:rPr lang="en-US" dirty="0"/>
-              <a:t>Fragment callbacks</a:t>
-            </a:r>
-          </a:p>
-        </p:txBody>
-      </p:sp>
-      <p:sp>
-        <p:nvSpPr>
-          <p:cNvPr id="3" name="Content Placeholder 2"/>
-          <p:cNvSpPr>
-            <a:spLocks noGrp="1"/>
-          </p:cNvSpPr>
-          <p:nvPr>
-            <p:ph idx="1"/>
-          </p:nvPr>
-        </p:nvSpPr>
-        <p:spPr/>
-        <p:txBody>
-          <a:bodyPr/>
-          <a:lstStyle/>
-          <a:p>
-            <a:endParaRPr lang="en-US" dirty="0"/>
-          </a:p>
-        </p:txBody>
-      </p:sp>
-    </p:spTree>
-    <p:extLst>
-      <p:ext uri="{BB962C8B-B14F-4D97-AF65-F5344CB8AC3E}">
-        <p14:creationId xmlns:p14="http://schemas.microsoft.com/office/powerpoint/2010/main" val="475706249"/>
-      </p:ext>
-    </p:extLst>
-  </p:cSld>
-  <p:clrMapOvr>
-    <a:masterClrMapping/>
-  </p:clrMapOvr>
-</p:sld>
-</file>
-
-<file path=ppt/slides/slide64.xml><?xml version="1.0" encoding="utf-8"?>
-<p:sld xmlns:a="http://schemas.openxmlformats.org/drawingml/2006/main" xmlns:r="http://schemas.openxmlformats.org/officeDocument/2006/relationships" xmlns:p="http://schemas.openxmlformats.org/presentationml/2006/main">
-  <p:cSld>
-    <p:spTree>
-      <p:nvGrpSpPr>
-        <p:cNvPr id="1" name=""/>
-        <p:cNvGrpSpPr/>
-        <p:nvPr/>
-      </p:nvGrpSpPr>
-      <p:grpSpPr>
-        <a:xfrm>
-          <a:off x="0" y="0"/>
-          <a:ext cx="0" cy="0"/>
-          <a:chOff x="0" y="0"/>
-          <a:chExt cx="0" cy="0"/>
-        </a:xfrm>
-      </p:grpSpPr>
-      <p:sp>
-        <p:nvSpPr>
-          <p:cNvPr id="2" name="Title 1"/>
-          <p:cNvSpPr>
-            <a:spLocks noGrp="1"/>
-          </p:cNvSpPr>
-          <p:nvPr>
-            <p:ph type="title"/>
-          </p:nvPr>
-        </p:nvSpPr>
-        <p:spPr/>
-        <p:txBody>
-          <a:bodyPr/>
-          <a:lstStyle/>
-          <a:p>
-            <a:r>
-              <a:rPr lang="en-US" dirty="0"/>
-              <a:t>Dynamic Fragments </a:t>
-            </a:r>
-          </a:p>
-        </p:txBody>
-      </p:sp>
-      <p:sp>
-        <p:nvSpPr>
-          <p:cNvPr id="3" name="Content Placeholder 2"/>
-          <p:cNvSpPr>
-            <a:spLocks noGrp="1"/>
-          </p:cNvSpPr>
-          <p:nvPr>
-            <p:ph idx="1"/>
-          </p:nvPr>
-        </p:nvSpPr>
-        <p:spPr/>
-        <p:txBody>
-          <a:bodyPr/>
-          <a:lstStyle/>
-          <a:p>
-            <a:endParaRPr lang="en-US"/>
-          </a:p>
-        </p:txBody>
-      </p:sp>
-    </p:spTree>
-    <p:extLst>
-      <p:ext uri="{BB962C8B-B14F-4D97-AF65-F5344CB8AC3E}">
-        <p14:creationId xmlns:p14="http://schemas.microsoft.com/office/powerpoint/2010/main" val="3668840453"/>
-      </p:ext>
-    </p:extLst>
-  </p:cSld>
-  <p:clrMapOvr>
-    <a:masterClrMapping/>
-  </p:clrMapOvr>
-</p:sld>
-</file>
-
-<file path=ppt/slides/slide65.xml><?xml version="1.0" encoding="utf-8"?>
-<p:sld xmlns:a="http://schemas.openxmlformats.org/drawingml/2006/main" xmlns:r="http://schemas.openxmlformats.org/officeDocument/2006/relationships" xmlns:p="http://schemas.openxmlformats.org/presentationml/2006/main">
-  <p:cSld>
-    <p:spTree>
-      <p:nvGrpSpPr>
-        <p:cNvPr id="1" name=""/>
-        <p:cNvGrpSpPr/>
-        <p:nvPr/>
-      </p:nvGrpSpPr>
-      <p:grpSpPr>
-        <a:xfrm>
-          <a:off x="0" y="0"/>
-          <a:ext cx="0" cy="0"/>
-          <a:chOff x="0" y="0"/>
-          <a:chExt cx="0" cy="0"/>
-        </a:xfrm>
-      </p:grpSpPr>
-      <p:sp>
-        <p:nvSpPr>
-          <p:cNvPr id="2" name="Title 1"/>
-          <p:cNvSpPr>
-            <a:spLocks noGrp="1"/>
-          </p:cNvSpPr>
-          <p:nvPr>
-            <p:ph type="title"/>
-          </p:nvPr>
-        </p:nvSpPr>
-        <p:spPr>
-          <a:xfrm>
-            <a:off x="0" y="457200"/>
-            <a:ext cx="9144000" cy="1143000"/>
-          </a:xfrm>
-        </p:spPr>
-        <p:txBody>
-          <a:bodyPr/>
-          <a:lstStyle/>
-          <a:p>
-            <a:r>
-              <a:rPr lang="en-US" dirty="0"/>
-              <a:t>Passing arguments to Fragments</a:t>
-            </a:r>
-          </a:p>
-        </p:txBody>
-      </p:sp>
-      <p:sp>
-        <p:nvSpPr>
-          <p:cNvPr id="3" name="Content Placeholder 2"/>
-          <p:cNvSpPr>
-            <a:spLocks noGrp="1"/>
-          </p:cNvSpPr>
-          <p:nvPr>
-            <p:ph idx="1"/>
-          </p:nvPr>
-        </p:nvSpPr>
-        <p:spPr/>
-        <p:txBody>
-          <a:bodyPr/>
-          <a:lstStyle/>
-          <a:p>
-            <a:endParaRPr lang="en-US" dirty="0"/>
-          </a:p>
-        </p:txBody>
-      </p:sp>
-    </p:spTree>
-    <p:extLst>
-      <p:ext uri="{BB962C8B-B14F-4D97-AF65-F5344CB8AC3E}">
-        <p14:creationId xmlns:p14="http://schemas.microsoft.com/office/powerpoint/2010/main" val="786261865"/>
-      </p:ext>
-    </p:extLst>
-  </p:cSld>
-  <p:clrMapOvr>
-    <a:masterClrMapping/>
-  </p:clrMapOvr>
+  <p:timing>
+    <p:tnLst>
+      <p:par>
+        <p:cTn id="1" dur="indefinite" restart="never" nodeType="tmRoot"/>
+      </p:par>
+    </p:tnLst>
+  </p:timing>
 </p:sld>
 </file>
 

</xml_diff>